<commit_message>
Update Machine Maintenance Analysis v2.pptx
</commit_message>
<xml_diff>
--- a/presentation/Machine Maintenance Analysis v2.pptx
+++ b/presentation/Machine Maintenance Analysis v2.pptx
@@ -5,7 +5,7 @@
     <p:sldMasterId id="2147483702" r:id="rId1"/>
   </p:sldMasterIdLst>
   <p:notesMasterIdLst>
-    <p:notesMasterId r:id="rId13"/>
+    <p:notesMasterId r:id="rId11"/>
   </p:notesMasterIdLst>
   <p:sldIdLst>
     <p:sldId id="256" r:id="rId2"/>
@@ -13,12 +13,10 @@
     <p:sldId id="258" r:id="rId4"/>
     <p:sldId id="270" r:id="rId5"/>
     <p:sldId id="268" r:id="rId6"/>
-    <p:sldId id="276" r:id="rId7"/>
-    <p:sldId id="273" r:id="rId8"/>
-    <p:sldId id="274" r:id="rId9"/>
-    <p:sldId id="271" r:id="rId10"/>
-    <p:sldId id="275" r:id="rId11"/>
-    <p:sldId id="267" r:id="rId12"/>
+    <p:sldId id="273" r:id="rId7"/>
+    <p:sldId id="274" r:id="rId8"/>
+    <p:sldId id="271" r:id="rId9"/>
+    <p:sldId id="267" r:id="rId10"/>
   </p:sldIdLst>
   <p:sldSz cx="9144000" cy="5143500" type="screen16x9"/>
   <p:notesSz cx="6858000" cy="9144000"/>
@@ -693,219 +691,6 @@
 </p:notes>
 </file>
 
-<file path=ppt/notesSlides/notesSlide10.xml><?xml version="1.0" encoding="utf-8"?>
-<p:notes xmlns:a="http://schemas.openxmlformats.org/drawingml/2006/main" xmlns:r="http://schemas.openxmlformats.org/officeDocument/2006/relationships" xmlns:p="http://schemas.openxmlformats.org/presentationml/2006/main" showMasterSp="0" showMasterPhAnim="0">
-  <p:cSld>
-    <p:spTree>
-      <p:nvGrpSpPr>
-        <p:cNvPr id="1" name="Shape 136"/>
-        <p:cNvGrpSpPr/>
-        <p:nvPr/>
-      </p:nvGrpSpPr>
-      <p:grpSpPr>
-        <a:xfrm>
-          <a:off x="0" y="0"/>
-          <a:ext cx="0" cy="0"/>
-          <a:chOff x="0" y="0"/>
-          <a:chExt cx="0" cy="0"/>
-        </a:xfrm>
-      </p:grpSpPr>
-      <p:sp>
-        <p:nvSpPr>
-          <p:cNvPr id="137" name="Google Shape;137;g2b8e99db5db_0_125:notes"/>
-          <p:cNvSpPr>
-            <a:spLocks noGrp="1" noRot="1" noChangeAspect="1"/>
-          </p:cNvSpPr>
-          <p:nvPr>
-            <p:ph type="sldImg" idx="2"/>
-          </p:nvPr>
-        </p:nvSpPr>
-        <p:spPr>
-          <a:xfrm>
-            <a:off x="381000" y="685800"/>
-            <a:ext cx="6096000" cy="3429000"/>
-          </a:xfrm>
-          <a:custGeom>
-            <a:avLst/>
-            <a:gdLst/>
-            <a:ahLst/>
-            <a:cxnLst/>
-            <a:rect l="l" t="t" r="r" b="b"/>
-            <a:pathLst>
-              <a:path w="120000" h="120000" extrusionOk="0">
-                <a:moveTo>
-                  <a:pt x="0" y="0"/>
-                </a:moveTo>
-                <a:lnTo>
-                  <a:pt x="120000" y="0"/>
-                </a:lnTo>
-                <a:lnTo>
-                  <a:pt x="120000" y="120000"/>
-                </a:lnTo>
-                <a:lnTo>
-                  <a:pt x="0" y="120000"/>
-                </a:lnTo>
-                <a:close/>
-              </a:path>
-            </a:pathLst>
-          </a:custGeom>
-        </p:spPr>
-      </p:sp>
-      <p:sp>
-        <p:nvSpPr>
-          <p:cNvPr id="138" name="Google Shape;138;g2b8e99db5db_0_125:notes"/>
-          <p:cNvSpPr txBox="1">
-            <a:spLocks noGrp="1"/>
-          </p:cNvSpPr>
-          <p:nvPr>
-            <p:ph type="body" idx="1"/>
-          </p:nvPr>
-        </p:nvSpPr>
-        <p:spPr>
-          <a:xfrm>
-            <a:off x="685800" y="4343400"/>
-            <a:ext cx="5486400" cy="4114800"/>
-          </a:xfrm>
-          <a:prstGeom prst="rect">
-            <a:avLst/>
-          </a:prstGeom>
-        </p:spPr>
-        <p:txBody>
-          <a:bodyPr spcFirstLastPara="1" wrap="square" lIns="91425" tIns="91425" rIns="91425" bIns="91425" anchor="t" anchorCtr="0">
-            <a:noAutofit/>
-          </a:bodyPr>
-          <a:lstStyle/>
-          <a:p>
-            <a:pPr marL="0" lvl="0" indent="0" algn="l" rtl="0">
-              <a:spcBef>
-                <a:spcPts val="0"/>
-              </a:spcBef>
-              <a:spcAft>
-                <a:spcPts val="0"/>
-              </a:spcAft>
-              <a:buNone/>
-            </a:pPr>
-            <a:endParaRPr/>
-          </a:p>
-        </p:txBody>
-      </p:sp>
-    </p:spTree>
-    <p:extLst>
-      <p:ext uri="{BB962C8B-B14F-4D97-AF65-F5344CB8AC3E}">
-        <p14:creationId xmlns:p14="http://schemas.microsoft.com/office/powerpoint/2010/main" val="3938516309"/>
-      </p:ext>
-    </p:extLst>
-  </p:cSld>
-  <p:clrMapOvr>
-    <a:masterClrMapping/>
-  </p:clrMapOvr>
-</p:notes>
-</file>
-
-<file path=ppt/notesSlides/notesSlide11.xml><?xml version="1.0" encoding="utf-8"?>
-<p:notes xmlns:a="http://schemas.openxmlformats.org/drawingml/2006/main" xmlns:r="http://schemas.openxmlformats.org/officeDocument/2006/relationships" xmlns:p="http://schemas.openxmlformats.org/presentationml/2006/main" showMasterSp="0" showMasterPhAnim="0">
-  <p:cSld>
-    <p:spTree>
-      <p:nvGrpSpPr>
-        <p:cNvPr id="1" name="Shape 237"/>
-        <p:cNvGrpSpPr/>
-        <p:nvPr/>
-      </p:nvGrpSpPr>
-      <p:grpSpPr>
-        <a:xfrm>
-          <a:off x="0" y="0"/>
-          <a:ext cx="0" cy="0"/>
-          <a:chOff x="0" y="0"/>
-          <a:chExt cx="0" cy="0"/>
-        </a:xfrm>
-      </p:grpSpPr>
-      <p:sp>
-        <p:nvSpPr>
-          <p:cNvPr id="238" name="Google Shape;238;g2b8e99db5db_0_238:notes"/>
-          <p:cNvSpPr>
-            <a:spLocks noGrp="1" noRot="1" noChangeAspect="1"/>
-          </p:cNvSpPr>
-          <p:nvPr>
-            <p:ph type="sldImg" idx="2"/>
-          </p:nvPr>
-        </p:nvSpPr>
-        <p:spPr>
-          <a:xfrm>
-            <a:off x="381000" y="685800"/>
-            <a:ext cx="6096000" cy="3429000"/>
-          </a:xfrm>
-          <a:custGeom>
-            <a:avLst/>
-            <a:gdLst/>
-            <a:ahLst/>
-            <a:cxnLst/>
-            <a:rect l="l" t="t" r="r" b="b"/>
-            <a:pathLst>
-              <a:path w="120000" h="120000" extrusionOk="0">
-                <a:moveTo>
-                  <a:pt x="0" y="0"/>
-                </a:moveTo>
-                <a:lnTo>
-                  <a:pt x="120000" y="0"/>
-                </a:lnTo>
-                <a:lnTo>
-                  <a:pt x="120000" y="120000"/>
-                </a:lnTo>
-                <a:lnTo>
-                  <a:pt x="0" y="120000"/>
-                </a:lnTo>
-                <a:close/>
-              </a:path>
-            </a:pathLst>
-          </a:custGeom>
-        </p:spPr>
-      </p:sp>
-      <p:sp>
-        <p:nvSpPr>
-          <p:cNvPr id="239" name="Google Shape;239;g2b8e99db5db_0_238:notes"/>
-          <p:cNvSpPr txBox="1">
-            <a:spLocks noGrp="1"/>
-          </p:cNvSpPr>
-          <p:nvPr>
-            <p:ph type="body" idx="1"/>
-          </p:nvPr>
-        </p:nvSpPr>
-        <p:spPr>
-          <a:xfrm>
-            <a:off x="685800" y="4343400"/>
-            <a:ext cx="5486400" cy="4114800"/>
-          </a:xfrm>
-          <a:prstGeom prst="rect">
-            <a:avLst/>
-          </a:prstGeom>
-        </p:spPr>
-        <p:txBody>
-          <a:bodyPr spcFirstLastPara="1" wrap="square" lIns="91425" tIns="91425" rIns="91425" bIns="91425" anchor="t" anchorCtr="0">
-            <a:noAutofit/>
-          </a:bodyPr>
-          <a:lstStyle/>
-          <a:p>
-            <a:pPr marL="0" lvl="0" indent="0" algn="l" rtl="0">
-              <a:spcBef>
-                <a:spcPts val="0"/>
-              </a:spcBef>
-              <a:spcAft>
-                <a:spcPts val="0"/>
-              </a:spcAft>
-              <a:buNone/>
-            </a:pPr>
-            <a:endParaRPr/>
-          </a:p>
-        </p:txBody>
-      </p:sp>
-    </p:spTree>
-  </p:cSld>
-  <p:clrMapOvr>
-    <a:masterClrMapping/>
-  </p:clrMapOvr>
-</p:notes>
-</file>
-
 <file path=ppt/notesSlides/notesSlide2.xml><?xml version="1.0" encoding="utf-8"?>
 <p:notes xmlns:a="http://schemas.openxmlformats.org/drawingml/2006/main" xmlns:r="http://schemas.openxmlformats.org/officeDocument/2006/relationships" xmlns:p="http://schemas.openxmlformats.org/presentationml/2006/main" showMasterSp="0" showMasterPhAnim="0">
   <p:cSld>
@@ -1431,7 +1216,7 @@
     </p:spTree>
     <p:extLst>
       <p:ext uri="{BB962C8B-B14F-4D97-AF65-F5344CB8AC3E}">
-        <p14:creationId xmlns:p14="http://schemas.microsoft.com/office/powerpoint/2010/main" val="1555434873"/>
+        <p14:creationId xmlns:p14="http://schemas.microsoft.com/office/powerpoint/2010/main" val="1928897340"/>
       </p:ext>
     </p:extLst>
   </p:cSld>
@@ -1540,7 +1325,7 @@
     </p:spTree>
     <p:extLst>
       <p:ext uri="{BB962C8B-B14F-4D97-AF65-F5344CB8AC3E}">
-        <p14:creationId xmlns:p14="http://schemas.microsoft.com/office/powerpoint/2010/main" val="1928897340"/>
+        <p14:creationId xmlns:p14="http://schemas.microsoft.com/office/powerpoint/2010/main" val="3618177173"/>
       </p:ext>
     </p:extLst>
   </p:cSld>
@@ -1649,7 +1434,7 @@
     </p:spTree>
     <p:extLst>
       <p:ext uri="{BB962C8B-B14F-4D97-AF65-F5344CB8AC3E}">
-        <p14:creationId xmlns:p14="http://schemas.microsoft.com/office/powerpoint/2010/main" val="3618177173"/>
+        <p14:creationId xmlns:p14="http://schemas.microsoft.com/office/powerpoint/2010/main" val="777673528"/>
       </p:ext>
     </p:extLst>
   </p:cSld>
@@ -1664,7 +1449,7 @@
   <p:cSld>
     <p:spTree>
       <p:nvGrpSpPr>
-        <p:cNvPr id="1" name="Shape 136"/>
+        <p:cNvPr id="1" name="Shape 237"/>
         <p:cNvGrpSpPr/>
         <p:nvPr/>
       </p:nvGrpSpPr>
@@ -1678,7 +1463,7 @@
       </p:grpSpPr>
       <p:sp>
         <p:nvSpPr>
-          <p:cNvPr id="137" name="Google Shape;137;g2b8e99db5db_0_125:notes"/>
+          <p:cNvPr id="238" name="Google Shape;238;g2b8e99db5db_0_238:notes"/>
           <p:cNvSpPr>
             <a:spLocks noGrp="1" noRot="1" noChangeAspect="1"/>
           </p:cNvSpPr>
@@ -1719,7 +1504,7 @@
       </p:sp>
       <p:sp>
         <p:nvSpPr>
-          <p:cNvPr id="138" name="Google Shape;138;g2b8e99db5db_0_125:notes"/>
+          <p:cNvPr id="239" name="Google Shape;239;g2b8e99db5db_0_238:notes"/>
           <p:cNvSpPr txBox="1">
             <a:spLocks noGrp="1"/>
           </p:cNvSpPr>
@@ -1756,11 +1541,6 @@
         </p:txBody>
       </p:sp>
     </p:spTree>
-    <p:extLst>
-      <p:ext uri="{BB962C8B-B14F-4D97-AF65-F5344CB8AC3E}">
-        <p14:creationId xmlns:p14="http://schemas.microsoft.com/office/powerpoint/2010/main" val="777673528"/>
-      </p:ext>
-    </p:extLst>
   </p:cSld>
   <p:clrMapOvr>
     <a:masterClrMapping/>
@@ -6467,968 +6247,6 @@
             <a:extLst>
               <a:ext uri="{FF2B5EF4-FFF2-40B4-BE49-F238E27FC236}">
                 <a16:creationId xmlns:a16="http://schemas.microsoft.com/office/drawing/2014/main" id="{5E057D60-15C8-2840-1CE8-EB84773A78C4}"/>
-              </a:ext>
-            </a:extLst>
-          </p:cNvPr>
-          <p:cNvPicPr>
-            <a:picLocks noChangeAspect="1"/>
-          </p:cNvPicPr>
-          <p:nvPr/>
-        </p:nvPicPr>
-        <p:blipFill rotWithShape="1">
-          <a:blip r:embed="rId3"/>
-          <a:srcRect l="33048"/>
-          <a:stretch/>
-        </p:blipFill>
-        <p:spPr>
-          <a:xfrm>
-            <a:off x="3983776" y="10"/>
-            <a:ext cx="5159081" cy="5143490"/>
-          </a:xfrm>
-          <a:custGeom>
-            <a:avLst/>
-            <a:gdLst/>
-            <a:ahLst/>
-            <a:cxnLst/>
-            <a:rect l="l" t="t" r="r" b="b"/>
-            <a:pathLst>
-              <a:path w="6878775" h="6858000">
-                <a:moveTo>
-                  <a:pt x="1102973" y="0"/>
-                </a:moveTo>
-                <a:lnTo>
-                  <a:pt x="1160688" y="0"/>
-                </a:lnTo>
-                <a:lnTo>
-                  <a:pt x="983189" y="331786"/>
-                </a:lnTo>
-                <a:cubicBezTo>
-                  <a:pt x="914866" y="469145"/>
-                  <a:pt x="850355" y="608712"/>
-                  <a:pt x="789261" y="750263"/>
-                </a:cubicBezTo>
-                <a:cubicBezTo>
-                  <a:pt x="774307" y="784928"/>
-                  <a:pt x="759992" y="819849"/>
-                  <a:pt x="745295" y="854514"/>
-                </a:cubicBezTo>
-                <a:cubicBezTo>
-                  <a:pt x="756682" y="845393"/>
-                  <a:pt x="765489" y="833492"/>
-                  <a:pt x="770857" y="819975"/>
-                </a:cubicBezTo>
-                <a:cubicBezTo>
-                  <a:pt x="879943" y="589569"/>
-                  <a:pt x="999605" y="365513"/>
-                  <a:pt x="1131329" y="148742"/>
-                </a:cubicBezTo>
-                <a:lnTo>
-                  <a:pt x="1227589" y="0"/>
-                </a:lnTo>
-                <a:lnTo>
-                  <a:pt x="6878775" y="0"/>
-                </a:lnTo>
-                <a:lnTo>
-                  <a:pt x="6878775" y="6858000"/>
-                </a:lnTo>
-                <a:lnTo>
-                  <a:pt x="713521" y="6858000"/>
-                </a:lnTo>
-                <a:lnTo>
-                  <a:pt x="625642" y="6670527"/>
-                </a:lnTo>
-                <a:cubicBezTo>
-                  <a:pt x="507232" y="6398531"/>
-                  <a:pt x="403083" y="6118381"/>
-                  <a:pt x="312785" y="5830359"/>
-                </a:cubicBezTo>
-                <a:cubicBezTo>
-                  <a:pt x="278149" y="5719759"/>
-                  <a:pt x="248879" y="5607635"/>
-                  <a:pt x="212198" y="5480401"/>
-                </a:cubicBezTo>
-                <a:cubicBezTo>
-                  <a:pt x="212208" y="5491601"/>
-                  <a:pt x="212803" y="5502788"/>
-                  <a:pt x="213988" y="5513923"/>
-                </a:cubicBezTo>
-                <a:cubicBezTo>
-                  <a:pt x="264089" y="5723695"/>
-                  <a:pt x="307290" y="5935370"/>
-                  <a:pt x="365826" y="6142729"/>
-                </a:cubicBezTo>
-                <a:cubicBezTo>
-                  <a:pt x="433152" y="6380817"/>
-                  <a:pt x="510068" y="6614016"/>
-                  <a:pt x="597975" y="6841549"/>
-                </a:cubicBezTo>
-                <a:lnTo>
-                  <a:pt x="604824" y="6858000"/>
-                </a:lnTo>
-                <a:lnTo>
-                  <a:pt x="552056" y="6858000"/>
-                </a:lnTo>
-                <a:lnTo>
-                  <a:pt x="539576" y="6828295"/>
-                </a:lnTo>
-                <a:cubicBezTo>
-                  <a:pt x="380597" y="6414594"/>
-                  <a:pt x="260223" y="5988893"/>
-                  <a:pt x="171555" y="5552906"/>
-                </a:cubicBezTo>
-                <a:cubicBezTo>
-                  <a:pt x="91163" y="5157998"/>
-                  <a:pt x="43746" y="4758899"/>
-                  <a:pt x="12305" y="4357388"/>
-                </a:cubicBezTo>
-                <a:cubicBezTo>
-                  <a:pt x="-14281" y="4013908"/>
-                  <a:pt x="4507" y="3672965"/>
-                  <a:pt x="46684" y="3331516"/>
-                </a:cubicBezTo>
-                <a:cubicBezTo>
-                  <a:pt x="127203" y="2664286"/>
-                  <a:pt x="277819" y="2007265"/>
-                  <a:pt x="496065" y="1371196"/>
-                </a:cubicBezTo>
-                <a:cubicBezTo>
-                  <a:pt x="636273" y="966066"/>
-                  <a:pt x="800445" y="573253"/>
-                  <a:pt x="995723" y="196614"/>
-                </a:cubicBezTo>
-                <a:close/>
-              </a:path>
-            </a:pathLst>
-          </a:custGeom>
-        </p:spPr>
-      </p:pic>
-    </p:spTree>
-  </p:cSld>
-  <p:clrMapOvr>
-    <a:masterClrMapping/>
-  </p:clrMapOvr>
-</p:sld>
-</file>
-
-<file path=ppt/slides/slide10.xml><?xml version="1.0" encoding="utf-8"?>
-<p:sld xmlns:a="http://schemas.openxmlformats.org/drawingml/2006/main" xmlns:r="http://schemas.openxmlformats.org/officeDocument/2006/relationships" xmlns:p="http://schemas.openxmlformats.org/presentationml/2006/main" show="0">
-  <p:cSld>
-    <p:bg>
-      <p:bgPr>
-        <a:solidFill>
-          <a:schemeClr val="bg1"/>
-        </a:solidFill>
-        <a:effectLst/>
-      </p:bgPr>
-    </p:bg>
-    <p:spTree>
-      <p:nvGrpSpPr>
-        <p:cNvPr id="1" name="Shape 139"/>
-        <p:cNvGrpSpPr/>
-        <p:nvPr/>
-      </p:nvGrpSpPr>
-      <p:grpSpPr>
-        <a:xfrm>
-          <a:off x="0" y="0"/>
-          <a:ext cx="0" cy="0"/>
-          <a:chOff x="0" y="0"/>
-          <a:chExt cx="0" cy="0"/>
-        </a:xfrm>
-      </p:grpSpPr>
-      <p:sp>
-        <p:nvSpPr>
-          <p:cNvPr id="2" name="Rectangle 1">
-            <a:extLst>
-              <a:ext uri="{FF2B5EF4-FFF2-40B4-BE49-F238E27FC236}">
-                <a16:creationId xmlns:a16="http://schemas.microsoft.com/office/drawing/2014/main" id="{C6B1A37C-AFC0-100C-9A8A-86DA043EB605}"/>
-              </a:ext>
-            </a:extLst>
-          </p:cNvPr>
-          <p:cNvSpPr/>
-          <p:nvPr/>
-        </p:nvSpPr>
-        <p:spPr>
-          <a:xfrm>
-            <a:off x="1596788" y="2662388"/>
-            <a:ext cx="1537648" cy="491319"/>
-          </a:xfrm>
-          <a:prstGeom prst="rect">
-            <a:avLst/>
-          </a:prstGeom>
-          <a:solidFill>
-            <a:schemeClr val="tx1"/>
-          </a:solidFill>
-          <a:ln>
-            <a:noFill/>
-          </a:ln>
-        </p:spPr>
-        <p:style>
-          <a:lnRef idx="2">
-            <a:schemeClr val="accent1">
-              <a:shade val="15000"/>
-            </a:schemeClr>
-          </a:lnRef>
-          <a:fillRef idx="1">
-            <a:schemeClr val="accent1"/>
-          </a:fillRef>
-          <a:effectRef idx="0">
-            <a:schemeClr val="accent1"/>
-          </a:effectRef>
-          <a:fontRef idx="minor">
-            <a:schemeClr val="lt1"/>
-          </a:fontRef>
-        </p:style>
-        <p:txBody>
-          <a:bodyPr rtlCol="0" anchor="ctr"/>
-          <a:lstStyle/>
-          <a:p>
-            <a:pPr algn="ctr"/>
-            <a:endParaRPr lang="en-US"/>
-          </a:p>
-        </p:txBody>
-      </p:sp>
-      <p:sp>
-        <p:nvSpPr>
-          <p:cNvPr id="140" name="Google Shape;140;p15"/>
-          <p:cNvSpPr txBox="1">
-            <a:spLocks noGrp="1"/>
-          </p:cNvSpPr>
-          <p:nvPr>
-            <p:ph type="title"/>
-          </p:nvPr>
-        </p:nvSpPr>
-        <p:spPr>
-          <a:xfrm>
-            <a:off x="856058" y="464345"/>
-            <a:ext cx="7429500" cy="550855"/>
-          </a:xfrm>
-          <a:prstGeom prst="rect">
-            <a:avLst/>
-          </a:prstGeom>
-        </p:spPr>
-        <p:txBody>
-          <a:bodyPr spcFirstLastPara="1" wrap="square" lIns="91425" tIns="91425" rIns="91425" bIns="91425" anchor="t" anchorCtr="0">
-            <a:normAutofit fontScale="90000"/>
-          </a:bodyPr>
-          <a:lstStyle/>
-          <a:p>
-            <a:pPr marL="0" lvl="0" indent="0" algn="l" rtl="0">
-              <a:spcBef>
-                <a:spcPts val="0"/>
-              </a:spcBef>
-              <a:spcAft>
-                <a:spcPts val="0"/>
-              </a:spcAft>
-              <a:buNone/>
-            </a:pPr>
-            <a:r>
-              <a:rPr lang="en" dirty="0">
-                <a:latin typeface="Arial" panose="020B0604020202020204" pitchFamily="34" charset="0"/>
-                <a:cs typeface="Arial" panose="020B0604020202020204" pitchFamily="34" charset="0"/>
-              </a:rPr>
-              <a:t>3) Conclusions &amp; Next Steps</a:t>
-            </a:r>
-            <a:endParaRPr dirty="0">
-              <a:latin typeface="Arial" panose="020B0604020202020204" pitchFamily="34" charset="0"/>
-              <a:cs typeface="Arial" panose="020B0604020202020204" pitchFamily="34" charset="0"/>
-            </a:endParaRPr>
-          </a:p>
-        </p:txBody>
-      </p:sp>
-      <p:sp>
-        <p:nvSpPr>
-          <p:cNvPr id="3" name="Content Placeholder 2">
-            <a:extLst>
-              <a:ext uri="{FF2B5EF4-FFF2-40B4-BE49-F238E27FC236}">
-                <a16:creationId xmlns:a16="http://schemas.microsoft.com/office/drawing/2014/main" id="{86084C64-28B7-74FA-CCF9-A3E8F95BDC19}"/>
-              </a:ext>
-            </a:extLst>
-          </p:cNvPr>
-          <p:cNvSpPr>
-            <a:spLocks noGrp="1"/>
-          </p:cNvSpPr>
-          <p:nvPr>
-            <p:ph sz="half" idx="2"/>
-          </p:nvPr>
-        </p:nvSpPr>
-        <p:spPr>
-          <a:xfrm>
-            <a:off x="856058" y="1207008"/>
-            <a:ext cx="7428406" cy="3285792"/>
-          </a:xfrm>
-        </p:spPr>
-        <p:txBody>
-          <a:bodyPr>
-            <a:noAutofit/>
-          </a:bodyPr>
-          <a:lstStyle/>
-          <a:p>
-            <a:r>
-              <a:rPr lang="en-US" sz="1200" dirty="0">
-                <a:latin typeface="Arial" panose="020B0604020202020204" pitchFamily="34" charset="0"/>
-                <a:cs typeface="Arial" panose="020B0604020202020204" pitchFamily="34" charset="0"/>
-              </a:rPr>
-              <a:t>Contrary to our initial null hypothesis, Torque was the leading cause of machine failure according to our models</a:t>
-            </a:r>
-          </a:p>
-          <a:p>
-            <a:r>
-              <a:rPr lang="en-US" sz="1200" dirty="0">
-                <a:latin typeface="Arial" panose="020B0604020202020204" pitchFamily="34" charset="0"/>
-                <a:cs typeface="Arial" panose="020B0604020202020204" pitchFamily="34" charset="0"/>
-              </a:rPr>
-              <a:t>Conducting an analysis on Oversampling vs </a:t>
-            </a:r>
-            <a:r>
-              <a:rPr lang="en-US" sz="1200" dirty="0" err="1">
-                <a:latin typeface="Arial" panose="020B0604020202020204" pitchFamily="34" charset="0"/>
-                <a:cs typeface="Arial" panose="020B0604020202020204" pitchFamily="34" charset="0"/>
-              </a:rPr>
-              <a:t>Undersampling</a:t>
-            </a:r>
-            <a:r>
-              <a:rPr lang="en-US" sz="1200" dirty="0">
-                <a:latin typeface="Arial" panose="020B0604020202020204" pitchFamily="34" charset="0"/>
-                <a:cs typeface="Arial" panose="020B0604020202020204" pitchFamily="34" charset="0"/>
-              </a:rPr>
-              <a:t> would help determine how good each model truly is, because…</a:t>
-            </a:r>
-          </a:p>
-          <a:p>
-            <a:r>
-              <a:rPr kumimoji="0" lang="en-US" sz="1200" b="0" i="0" u="none" strike="noStrike" kern="1200" cap="none" spc="0" normalizeH="0" baseline="0" noProof="0" dirty="0">
-                <a:ln>
-                  <a:noFill/>
-                </a:ln>
-                <a:effectLst/>
-                <a:uLnTx/>
-                <a:uFillTx/>
-                <a:latin typeface="Arial" panose="020B0604020202020204" pitchFamily="34" charset="0"/>
-                <a:ea typeface="+mn-ea"/>
-                <a:cs typeface="Arial" panose="020B0604020202020204" pitchFamily="34" charset="0"/>
-              </a:rPr>
-              <a:t>…developing an algorithm that only states “No Failure” will be accurate 96.5% of the time and performs better than any of our models or ChatGPT! </a:t>
-            </a:r>
-            <a:r>
-              <a:rPr lang="en-US" sz="1200" dirty="0">
-                <a:latin typeface="Arial" panose="020B0604020202020204" pitchFamily="34" charset="0"/>
-                <a:cs typeface="Arial" panose="020B0604020202020204" pitchFamily="34" charset="0"/>
-              </a:rPr>
-              <a:t>So instead of all this we could have written the below code and saved the environment from all these machine learning processes…</a:t>
-            </a:r>
-          </a:p>
-          <a:p>
-            <a:pPr marL="0" indent="0">
-              <a:buNone/>
-            </a:pPr>
-            <a:r>
-              <a:rPr kumimoji="0" lang="en-US" sz="1200" b="0" i="0" u="none" strike="noStrike" kern="1200" cap="none" spc="0" normalizeH="0" baseline="0" noProof="0" dirty="0">
-                <a:ln>
-                  <a:noFill/>
-                </a:ln>
-                <a:effectLst/>
-                <a:uLnTx/>
-                <a:uFillTx/>
-                <a:latin typeface="Arial" panose="020B0604020202020204" pitchFamily="34" charset="0"/>
-                <a:ea typeface="+mn-ea"/>
-                <a:cs typeface="Arial" panose="020B0604020202020204" pitchFamily="34" charset="0"/>
-              </a:rPr>
-              <a:t>	</a:t>
-            </a:r>
-            <a:r>
-              <a:rPr kumimoji="0" lang="en-US" sz="1200" b="0" i="0" u="none" strike="noStrike" kern="1200" cap="none" spc="0" normalizeH="0" baseline="0" noProof="0" dirty="0">
-                <a:ln>
-                  <a:noFill/>
-                </a:ln>
-                <a:solidFill>
-                  <a:schemeClr val="bg1"/>
-                </a:solidFill>
-                <a:effectLst/>
-                <a:uLnTx/>
-                <a:uFillTx/>
-                <a:latin typeface="Arial" panose="020B0604020202020204" pitchFamily="34" charset="0"/>
-                <a:ea typeface="+mn-ea"/>
-                <a:cs typeface="Arial" panose="020B0604020202020204" pitchFamily="34" charset="0"/>
-              </a:rPr>
-              <a:t>def </a:t>
-            </a:r>
-            <a:r>
-              <a:rPr kumimoji="0" lang="en-US" sz="1200" b="0" i="0" u="none" strike="noStrike" kern="1200" cap="none" spc="0" normalizeH="0" baseline="0" noProof="0" dirty="0" err="1">
-                <a:ln>
-                  <a:noFill/>
-                </a:ln>
-                <a:solidFill>
-                  <a:schemeClr val="bg1"/>
-                </a:solidFill>
-                <a:effectLst/>
-                <a:uLnTx/>
-                <a:uFillTx/>
-                <a:latin typeface="Arial" panose="020B0604020202020204" pitchFamily="34" charset="0"/>
-                <a:ea typeface="+mn-ea"/>
-                <a:cs typeface="Arial" panose="020B0604020202020204" pitchFamily="34" charset="0"/>
-              </a:rPr>
-              <a:t>predict_failure</a:t>
-            </a:r>
-            <a:r>
-              <a:rPr kumimoji="0" lang="en-US" sz="1200" b="0" i="0" u="none" strike="noStrike" kern="1200" cap="none" spc="0" normalizeH="0" baseline="0" noProof="0" dirty="0">
-                <a:ln>
-                  <a:noFill/>
-                </a:ln>
-                <a:solidFill>
-                  <a:schemeClr val="bg1"/>
-                </a:solidFill>
-                <a:effectLst/>
-                <a:uLnTx/>
-                <a:uFillTx/>
-                <a:latin typeface="Arial" panose="020B0604020202020204" pitchFamily="34" charset="0"/>
-                <a:ea typeface="+mn-ea"/>
-                <a:cs typeface="Arial" panose="020B0604020202020204" pitchFamily="34" charset="0"/>
-              </a:rPr>
-              <a:t>(</a:t>
-            </a:r>
-            <a:r>
-              <a:rPr kumimoji="0" lang="en-US" sz="1200" b="0" i="0" u="none" strike="noStrike" kern="1200" cap="none" spc="0" normalizeH="0" baseline="0" noProof="0" dirty="0" err="1">
-                <a:ln>
-                  <a:noFill/>
-                </a:ln>
-                <a:solidFill>
-                  <a:schemeClr val="bg1"/>
-                </a:solidFill>
-                <a:effectLst/>
-                <a:uLnTx/>
-                <a:uFillTx/>
-                <a:latin typeface="Arial" panose="020B0604020202020204" pitchFamily="34" charset="0"/>
-                <a:ea typeface="+mn-ea"/>
-                <a:cs typeface="Arial" panose="020B0604020202020204" pitchFamily="34" charset="0"/>
-              </a:rPr>
-              <a:t>df</a:t>
-            </a:r>
-            <a:r>
-              <a:rPr kumimoji="0" lang="en-US" sz="1200" b="0" i="0" u="none" strike="noStrike" kern="1200" cap="none" spc="0" normalizeH="0" baseline="0" noProof="0" dirty="0">
-                <a:ln>
-                  <a:noFill/>
-                </a:ln>
-                <a:solidFill>
-                  <a:schemeClr val="bg1"/>
-                </a:solidFill>
-                <a:effectLst/>
-                <a:uLnTx/>
-                <a:uFillTx/>
-                <a:latin typeface="Arial" panose="020B0604020202020204" pitchFamily="34" charset="0"/>
-                <a:ea typeface="+mn-ea"/>
-                <a:cs typeface="Arial" panose="020B0604020202020204" pitchFamily="34" charset="0"/>
-              </a:rPr>
-              <a:t>):</a:t>
-            </a:r>
-          </a:p>
-          <a:p>
-            <a:pPr marL="0" indent="0">
-              <a:buNone/>
-            </a:pPr>
-            <a:r>
-              <a:rPr lang="en-US" sz="1200" dirty="0">
-                <a:solidFill>
-                  <a:schemeClr val="bg1"/>
-                </a:solidFill>
-                <a:latin typeface="Arial" panose="020B0604020202020204" pitchFamily="34" charset="0"/>
-                <a:cs typeface="Arial" panose="020B0604020202020204" pitchFamily="34" charset="0"/>
-              </a:rPr>
-              <a:t>	       </a:t>
-            </a:r>
-            <a:r>
-              <a:rPr kumimoji="0" lang="en-US" sz="1200" b="0" i="0" u="none" strike="noStrike" kern="1200" cap="none" spc="0" normalizeH="0" baseline="0" noProof="0" dirty="0">
-                <a:ln>
-                  <a:noFill/>
-                </a:ln>
-                <a:solidFill>
-                  <a:schemeClr val="bg1"/>
-                </a:solidFill>
-                <a:effectLst/>
-                <a:uLnTx/>
-                <a:uFillTx/>
-                <a:latin typeface="Arial" panose="020B0604020202020204" pitchFamily="34" charset="0"/>
-                <a:ea typeface="+mn-ea"/>
-                <a:cs typeface="Arial" panose="020B0604020202020204" pitchFamily="34" charset="0"/>
-              </a:rPr>
-              <a:t>return </a:t>
-            </a:r>
-            <a:r>
-              <a:rPr kumimoji="0" lang="en-US" sz="1200" b="0" i="0" u="none" strike="noStrike" kern="1200" cap="none" spc="0" normalizeH="0" baseline="0" noProof="0" dirty="0">
-                <a:ln>
-                  <a:noFill/>
-                </a:ln>
-                <a:solidFill>
-                  <a:srgbClr val="92D050"/>
-                </a:solidFill>
-                <a:effectLst/>
-                <a:uLnTx/>
-                <a:uFillTx/>
-                <a:latin typeface="Arial" panose="020B0604020202020204" pitchFamily="34" charset="0"/>
-                <a:ea typeface="+mn-ea"/>
-                <a:cs typeface="Arial" panose="020B0604020202020204" pitchFamily="34" charset="0"/>
-              </a:rPr>
-              <a:t>False</a:t>
-            </a:r>
-          </a:p>
-        </p:txBody>
-      </p:sp>
-    </p:spTree>
-    <p:extLst>
-      <p:ext uri="{BB962C8B-B14F-4D97-AF65-F5344CB8AC3E}">
-        <p14:creationId xmlns:p14="http://schemas.microsoft.com/office/powerpoint/2010/main" val="1245388853"/>
-      </p:ext>
-    </p:extLst>
-  </p:cSld>
-  <p:clrMapOvr>
-    <a:masterClrMapping/>
-  </p:clrMapOvr>
-</p:sld>
-</file>
-
-<file path=ppt/slides/slide11.xml><?xml version="1.0" encoding="utf-8"?>
-<p:sld xmlns:a="http://schemas.openxmlformats.org/drawingml/2006/main" xmlns:r="http://schemas.openxmlformats.org/officeDocument/2006/relationships" xmlns:p="http://schemas.openxmlformats.org/presentationml/2006/main">
-  <p:cSld>
-    <p:bg>
-      <p:bgPr>
-        <a:solidFill>
-          <a:schemeClr val="bg1"/>
-        </a:solidFill>
-        <a:effectLst/>
-      </p:bgPr>
-    </p:bg>
-    <p:spTree>
-      <p:nvGrpSpPr>
-        <p:cNvPr id="1" name="Shape 240"/>
-        <p:cNvGrpSpPr/>
-        <p:nvPr/>
-      </p:nvGrpSpPr>
-      <p:grpSpPr>
-        <a:xfrm>
-          <a:off x="0" y="0"/>
-          <a:ext cx="0" cy="0"/>
-          <a:chOff x="0" y="0"/>
-          <a:chExt cx="0" cy="0"/>
-        </a:xfrm>
-      </p:grpSpPr>
-      <p:sp useBgFill="1">
-        <p:nvSpPr>
-          <p:cNvPr id="248" name="Rectangle 247">
-            <a:extLst>
-              <a:ext uri="{FF2B5EF4-FFF2-40B4-BE49-F238E27FC236}">
-                <a16:creationId xmlns:a16="http://schemas.microsoft.com/office/drawing/2014/main" id="{F13C74B1-5B17-4795-BED0-7140497B445A}"/>
-              </a:ext>
-              <a:ext uri="{C183D7F6-B498-43B3-948B-1728B52AA6E4}">
-                <adec:decorative xmlns:adec="http://schemas.microsoft.com/office/drawing/2017/decorative" val="1"/>
-              </a:ext>
-            </a:extLst>
-          </p:cNvPr>
-          <p:cNvSpPr>
-            <a:spLocks noGrp="1" noRot="1" noChangeAspect="1" noMove="1" noResize="1" noEditPoints="1" noAdjustHandles="1" noChangeArrowheads="1" noChangeShapeType="1" noTextEdit="1"/>
-          </p:cNvSpPr>
-          <p:nvPr>
-            <p:extLst>
-              <p:ext uri="{386F3935-93C4-4BCD-93E2-E3B085C9AB24}">
-                <p16:designElem xmlns:p16="http://schemas.microsoft.com/office/powerpoint/2015/main" val="1"/>
-              </p:ext>
-            </p:extLst>
-          </p:nvPr>
-        </p:nvSpPr>
-        <p:spPr>
-          <a:xfrm>
-            <a:off x="0" y="0"/>
-            <a:ext cx="9141714" cy="5143500"/>
-          </a:xfrm>
-          <a:prstGeom prst="rect">
-            <a:avLst/>
-          </a:prstGeom>
-          <a:ln>
-            <a:noFill/>
-          </a:ln>
-        </p:spPr>
-        <p:style>
-          <a:lnRef idx="2">
-            <a:schemeClr val="accent1">
-              <a:shade val="50000"/>
-            </a:schemeClr>
-          </a:lnRef>
-          <a:fillRef idx="1">
-            <a:schemeClr val="accent1"/>
-          </a:fillRef>
-          <a:effectRef idx="0">
-            <a:schemeClr val="accent1"/>
-          </a:effectRef>
-          <a:fontRef idx="minor">
-            <a:schemeClr val="lt1"/>
-          </a:fontRef>
-        </p:style>
-        <p:txBody>
-          <a:bodyPr rtlCol="0" anchor="ctr"/>
-          <a:lstStyle/>
-          <a:p>
-            <a:pPr algn="ctr"/>
-            <a:endParaRPr lang="en-US"/>
-          </a:p>
-        </p:txBody>
-      </p:sp>
-      <p:sp>
-        <p:nvSpPr>
-          <p:cNvPr id="241" name="Google Shape;241;p24"/>
-          <p:cNvSpPr txBox="1">
-            <a:spLocks noGrp="1"/>
-          </p:cNvSpPr>
-          <p:nvPr>
-            <p:ph type="title"/>
-          </p:nvPr>
-        </p:nvSpPr>
-        <p:spPr>
-          <a:xfrm>
-            <a:off x="480060" y="244026"/>
-            <a:ext cx="3276451" cy="1467631"/>
-          </a:xfrm>
-          <a:prstGeom prst="rect">
-            <a:avLst/>
-          </a:prstGeom>
-        </p:spPr>
-        <p:txBody>
-          <a:bodyPr spcFirstLastPara="1" vert="horz" lIns="91440" tIns="45720" rIns="91440" bIns="45720" rtlCol="0" anchor="b" anchorCtr="0">
-            <a:normAutofit/>
-          </a:bodyPr>
-          <a:lstStyle/>
-          <a:p>
-            <a:pPr marL="0" lvl="0" indent="0" algn="l" defTabSz="914400">
-              <a:spcBef>
-                <a:spcPct val="0"/>
-              </a:spcBef>
-              <a:spcAft>
-                <a:spcPts val="0"/>
-              </a:spcAft>
-            </a:pPr>
-            <a:r>
-              <a:rPr lang="en-US" sz="4100">
-                <a:solidFill>
-                  <a:schemeClr val="tx1"/>
-                </a:solidFill>
-              </a:rPr>
-              <a:t>Fin</a:t>
-            </a:r>
-          </a:p>
-        </p:txBody>
-      </p:sp>
-      <p:sp>
-        <p:nvSpPr>
-          <p:cNvPr id="250" name="sketchy line">
-            <a:extLst>
-              <a:ext uri="{FF2B5EF4-FFF2-40B4-BE49-F238E27FC236}">
-                <a16:creationId xmlns:a16="http://schemas.microsoft.com/office/drawing/2014/main" id="{D4974D33-8DC5-464E-8C6D-BE58F0669C17}"/>
-              </a:ext>
-              <a:ext uri="{C183D7F6-B498-43B3-948B-1728B52AA6E4}">
-                <adec:decorative xmlns:adec="http://schemas.microsoft.com/office/drawing/2017/decorative" val="1"/>
-              </a:ext>
-            </a:extLst>
-          </p:cNvPr>
-          <p:cNvSpPr>
-            <a:spLocks noGrp="1" noRot="1" noChangeAspect="1" noMove="1" noResize="1" noEditPoints="1" noAdjustHandles="1" noChangeArrowheads="1" noChangeShapeType="1" noTextEdit="1"/>
-          </p:cNvSpPr>
-          <p:nvPr>
-            <p:extLst>
-              <p:ext uri="{386F3935-93C4-4BCD-93E2-E3B085C9AB24}">
-                <p16:designElem xmlns:p16="http://schemas.microsoft.com/office/powerpoint/2015/main" val="1"/>
-              </p:ext>
-            </p:extLst>
-          </p:nvPr>
-        </p:nvSpPr>
-        <p:spPr>
-          <a:xfrm>
-            <a:off x="480060" y="1940245"/>
-            <a:ext cx="2606040" cy="13716"/>
-          </a:xfrm>
-          <a:custGeom>
-            <a:avLst/>
-            <a:gdLst>
-              <a:gd name="connsiteX0" fmla="*/ 0 w 2606040"/>
-              <a:gd name="connsiteY0" fmla="*/ 0 h 13716"/>
-              <a:gd name="connsiteX1" fmla="*/ 625450 w 2606040"/>
-              <a:gd name="connsiteY1" fmla="*/ 0 h 13716"/>
-              <a:gd name="connsiteX2" fmla="*/ 1224839 w 2606040"/>
-              <a:gd name="connsiteY2" fmla="*/ 0 h 13716"/>
-              <a:gd name="connsiteX3" fmla="*/ 1824228 w 2606040"/>
-              <a:gd name="connsiteY3" fmla="*/ 0 h 13716"/>
-              <a:gd name="connsiteX4" fmla="*/ 2606040 w 2606040"/>
-              <a:gd name="connsiteY4" fmla="*/ 0 h 13716"/>
-              <a:gd name="connsiteX5" fmla="*/ 2606040 w 2606040"/>
-              <a:gd name="connsiteY5" fmla="*/ 13716 h 13716"/>
-              <a:gd name="connsiteX6" fmla="*/ 1902409 w 2606040"/>
-              <a:gd name="connsiteY6" fmla="*/ 13716 h 13716"/>
-              <a:gd name="connsiteX7" fmla="*/ 1276960 w 2606040"/>
-              <a:gd name="connsiteY7" fmla="*/ 13716 h 13716"/>
-              <a:gd name="connsiteX8" fmla="*/ 677570 w 2606040"/>
-              <a:gd name="connsiteY8" fmla="*/ 13716 h 13716"/>
-              <a:gd name="connsiteX9" fmla="*/ 0 w 2606040"/>
-              <a:gd name="connsiteY9" fmla="*/ 13716 h 13716"/>
-              <a:gd name="connsiteX10" fmla="*/ 0 w 2606040"/>
-              <a:gd name="connsiteY10" fmla="*/ 0 h 13716"/>
-            </a:gdLst>
-            <a:ahLst/>
-            <a:cxnLst>
-              <a:cxn ang="0">
-                <a:pos x="connsiteX0" y="connsiteY0"/>
-              </a:cxn>
-              <a:cxn ang="0">
-                <a:pos x="connsiteX1" y="connsiteY1"/>
-              </a:cxn>
-              <a:cxn ang="0">
-                <a:pos x="connsiteX2" y="connsiteY2"/>
-              </a:cxn>
-              <a:cxn ang="0">
-                <a:pos x="connsiteX3" y="connsiteY3"/>
-              </a:cxn>
-              <a:cxn ang="0">
-                <a:pos x="connsiteX4" y="connsiteY4"/>
-              </a:cxn>
-              <a:cxn ang="0">
-                <a:pos x="connsiteX5" y="connsiteY5"/>
-              </a:cxn>
-              <a:cxn ang="0">
-                <a:pos x="connsiteX6" y="connsiteY6"/>
-              </a:cxn>
-              <a:cxn ang="0">
-                <a:pos x="connsiteX7" y="connsiteY7"/>
-              </a:cxn>
-              <a:cxn ang="0">
-                <a:pos x="connsiteX8" y="connsiteY8"/>
-              </a:cxn>
-              <a:cxn ang="0">
-                <a:pos x="connsiteX9" y="connsiteY9"/>
-              </a:cxn>
-              <a:cxn ang="0">
-                <a:pos x="connsiteX10" y="connsiteY10"/>
-              </a:cxn>
-            </a:cxnLst>
-            <a:rect l="l" t="t" r="r" b="b"/>
-            <a:pathLst>
-              <a:path w="2606040" h="13716" fill="none" extrusionOk="0">
-                <a:moveTo>
-                  <a:pt x="0" y="0"/>
-                </a:moveTo>
-                <a:cubicBezTo>
-                  <a:pt x="266776" y="-600"/>
-                  <a:pt x="322756" y="3201"/>
-                  <a:pt x="625450" y="0"/>
-                </a:cubicBezTo>
-                <a:cubicBezTo>
-                  <a:pt x="928144" y="-3201"/>
-                  <a:pt x="968141" y="9269"/>
-                  <a:pt x="1224839" y="0"/>
-                </a:cubicBezTo>
-                <a:cubicBezTo>
-                  <a:pt x="1481537" y="-9269"/>
-                  <a:pt x="1569059" y="21947"/>
-                  <a:pt x="1824228" y="0"/>
-                </a:cubicBezTo>
-                <a:cubicBezTo>
-                  <a:pt x="2079397" y="-21947"/>
-                  <a:pt x="2326053" y="-10194"/>
-                  <a:pt x="2606040" y="0"/>
-                </a:cubicBezTo>
-                <a:cubicBezTo>
-                  <a:pt x="2605690" y="5728"/>
-                  <a:pt x="2605650" y="7624"/>
-                  <a:pt x="2606040" y="13716"/>
-                </a:cubicBezTo>
-                <a:cubicBezTo>
-                  <a:pt x="2256758" y="26838"/>
-                  <a:pt x="2173673" y="-17450"/>
-                  <a:pt x="1902409" y="13716"/>
-                </a:cubicBezTo>
-                <a:cubicBezTo>
-                  <a:pt x="1631145" y="44882"/>
-                  <a:pt x="1461378" y="894"/>
-                  <a:pt x="1276960" y="13716"/>
-                </a:cubicBezTo>
-                <a:cubicBezTo>
-                  <a:pt x="1092542" y="26538"/>
-                  <a:pt x="890442" y="8641"/>
-                  <a:pt x="677570" y="13716"/>
-                </a:cubicBezTo>
-                <a:cubicBezTo>
-                  <a:pt x="464698" y="18792"/>
-                  <a:pt x="187648" y="31265"/>
-                  <a:pt x="0" y="13716"/>
-                </a:cubicBezTo>
-                <a:cubicBezTo>
-                  <a:pt x="-302" y="10335"/>
-                  <a:pt x="417" y="4724"/>
-                  <a:pt x="0" y="0"/>
-                </a:cubicBezTo>
-                <a:close/>
-              </a:path>
-              <a:path w="2606040" h="13716" stroke="0" extrusionOk="0">
-                <a:moveTo>
-                  <a:pt x="0" y="0"/>
-                </a:moveTo>
-                <a:cubicBezTo>
-                  <a:pt x="197231" y="3803"/>
-                  <a:pt x="358914" y="-9291"/>
-                  <a:pt x="599389" y="0"/>
-                </a:cubicBezTo>
-                <a:cubicBezTo>
-                  <a:pt x="839864" y="9291"/>
-                  <a:pt x="979371" y="8509"/>
-                  <a:pt x="1303020" y="0"/>
-                </a:cubicBezTo>
-                <a:cubicBezTo>
-                  <a:pt x="1626669" y="-8509"/>
-                  <a:pt x="1726300" y="7440"/>
-                  <a:pt x="1876349" y="0"/>
-                </a:cubicBezTo>
-                <a:cubicBezTo>
-                  <a:pt x="2026398" y="-7440"/>
-                  <a:pt x="2430712" y="17957"/>
-                  <a:pt x="2606040" y="0"/>
-                </a:cubicBezTo>
-                <a:cubicBezTo>
-                  <a:pt x="2606569" y="5071"/>
-                  <a:pt x="2606315" y="7437"/>
-                  <a:pt x="2606040" y="13716"/>
-                </a:cubicBezTo>
-                <a:cubicBezTo>
-                  <a:pt x="2393024" y="-2332"/>
-                  <a:pt x="2191161" y="34687"/>
-                  <a:pt x="1980590" y="13716"/>
-                </a:cubicBezTo>
-                <a:cubicBezTo>
-                  <a:pt x="1770019" y="-7255"/>
-                  <a:pt x="1476440" y="31542"/>
-                  <a:pt x="1276960" y="13716"/>
-                </a:cubicBezTo>
-                <a:cubicBezTo>
-                  <a:pt x="1077480" y="-4110"/>
-                  <a:pt x="880988" y="37553"/>
-                  <a:pt x="651510" y="13716"/>
-                </a:cubicBezTo>
-                <a:cubicBezTo>
-                  <a:pt x="422032" y="-10121"/>
-                  <a:pt x="130744" y="-6519"/>
-                  <a:pt x="0" y="13716"/>
-                </a:cubicBezTo>
-                <a:cubicBezTo>
-                  <a:pt x="198" y="8947"/>
-                  <a:pt x="304" y="5200"/>
-                  <a:pt x="0" y="0"/>
-                </a:cubicBezTo>
-                <a:close/>
-              </a:path>
-            </a:pathLst>
-          </a:custGeom>
-          <a:solidFill>
-            <a:schemeClr val="accent2"/>
-          </a:solidFill>
-          <a:ln w="44450" cap="rnd">
-            <a:solidFill>
-              <a:schemeClr val="accent2"/>
-            </a:solidFill>
-            <a:round/>
-            <a:extLst>
-              <a:ext uri="{C807C97D-BFC1-408E-A445-0C87EB9F89A2}">
-                <ask:lineSketchStyleProps xmlns:ask="http://schemas.microsoft.com/office/drawing/2018/sketchyshapes" sd="2863741219">
-                  <a:prstGeom prst="rect">
-                    <a:avLst/>
-                  </a:prstGeom>
-                  <ask:type>
-                    <ask:lineSketchFreehand/>
-                  </ask:type>
-                </ask:lineSketchStyleProps>
-              </a:ext>
-            </a:extLst>
-          </a:ln>
-        </p:spPr>
-        <p:style>
-          <a:lnRef idx="2">
-            <a:schemeClr val="accent1">
-              <a:shade val="50000"/>
-            </a:schemeClr>
-          </a:lnRef>
-          <a:fillRef idx="1">
-            <a:schemeClr val="accent1"/>
-          </a:fillRef>
-          <a:effectRef idx="0">
-            <a:schemeClr val="accent1"/>
-          </a:effectRef>
-          <a:fontRef idx="minor">
-            <a:schemeClr val="lt1"/>
-          </a:fontRef>
-        </p:style>
-        <p:txBody>
-          <a:bodyPr rtlCol="0" anchor="ctr"/>
-          <a:lstStyle/>
-          <a:p>
-            <a:pPr algn="ctr"/>
-            <a:endParaRPr lang="en-US"/>
-          </a:p>
-        </p:txBody>
-      </p:sp>
-      <p:sp>
-        <p:nvSpPr>
-          <p:cNvPr id="242" name="Google Shape;242;p24"/>
-          <p:cNvSpPr txBox="1">
-            <a:spLocks noGrp="1"/>
-          </p:cNvSpPr>
-          <p:nvPr>
-            <p:ph type="body" idx="1"/>
-          </p:nvPr>
-        </p:nvSpPr>
-        <p:spPr>
-          <a:xfrm>
-            <a:off x="480060" y="2154674"/>
-            <a:ext cx="3182691" cy="2490501"/>
-          </a:xfrm>
-          <a:prstGeom prst="rect">
-            <a:avLst/>
-          </a:prstGeom>
-        </p:spPr>
-        <p:txBody>
-          <a:bodyPr spcFirstLastPara="1" vert="horz" lIns="91440" tIns="45720" rIns="91440" bIns="45720" rtlCol="0" anchorCtr="0">
-            <a:normAutofit/>
-          </a:bodyPr>
-          <a:lstStyle/>
-          <a:p>
-            <a:pPr marL="0" lvl="0" indent="0" algn="l" defTabSz="914400">
-              <a:spcBef>
-                <a:spcPts val="0"/>
-              </a:spcBef>
-              <a:spcAft>
-                <a:spcPts val="600"/>
-              </a:spcAft>
-              <a:buNone/>
-            </a:pPr>
-            <a:r>
-              <a:rPr lang="en-US" sz="1700" dirty="0"/>
-              <a:t>Reach out to Group 3 with any machine maintenance needs…</a:t>
-            </a:r>
-          </a:p>
-          <a:p>
-            <a:pPr marL="0" lvl="0" indent="0" algn="l" defTabSz="914400">
-              <a:spcBef>
-                <a:spcPts val="0"/>
-              </a:spcBef>
-              <a:spcAft>
-                <a:spcPts val="600"/>
-              </a:spcAft>
-              <a:buNone/>
-            </a:pPr>
-            <a:r>
-              <a:rPr lang="en-US" sz="1700" dirty="0"/>
-              <a:t>Thank you!!</a:t>
-            </a:r>
-          </a:p>
-        </p:txBody>
-      </p:sp>
-      <p:pic>
-        <p:nvPicPr>
-          <p:cNvPr id="244" name="Picture 243" descr="CNC lathe processing">
-            <a:extLst>
-              <a:ext uri="{FF2B5EF4-FFF2-40B4-BE49-F238E27FC236}">
-                <a16:creationId xmlns:a16="http://schemas.microsoft.com/office/drawing/2014/main" id="{DBC0278C-3B74-F789-DD8A-CE485BB85436}"/>
               </a:ext>
             </a:extLst>
           </p:cNvPr>
@@ -12762,603 +11580,6 @@
 </file>
 
 <file path=ppt/slides/slide6.xml><?xml version="1.0" encoding="utf-8"?>
-<p:sld xmlns:a="http://schemas.openxmlformats.org/drawingml/2006/main" xmlns:r="http://schemas.openxmlformats.org/officeDocument/2006/relationships" xmlns:p="http://schemas.openxmlformats.org/presentationml/2006/main" show="0">
-  <p:cSld>
-    <p:bg>
-      <p:bgPr>
-        <a:solidFill>
-          <a:schemeClr val="bg1"/>
-        </a:solidFill>
-        <a:effectLst/>
-      </p:bgPr>
-    </p:bg>
-    <p:spTree>
-      <p:nvGrpSpPr>
-        <p:cNvPr id="1" name="Shape 139"/>
-        <p:cNvGrpSpPr/>
-        <p:nvPr/>
-      </p:nvGrpSpPr>
-      <p:grpSpPr>
-        <a:xfrm>
-          <a:off x="0" y="0"/>
-          <a:ext cx="0" cy="0"/>
-          <a:chOff x="0" y="0"/>
-          <a:chExt cx="0" cy="0"/>
-        </a:xfrm>
-      </p:grpSpPr>
-      <p:sp>
-        <p:nvSpPr>
-          <p:cNvPr id="140" name="Google Shape;140;p15"/>
-          <p:cNvSpPr txBox="1">
-            <a:spLocks noGrp="1"/>
-          </p:cNvSpPr>
-          <p:nvPr>
-            <p:ph type="title"/>
-          </p:nvPr>
-        </p:nvSpPr>
-        <p:spPr>
-          <a:xfrm>
-            <a:off x="856058" y="464345"/>
-            <a:ext cx="7429500" cy="550855"/>
-          </a:xfrm>
-          <a:prstGeom prst="rect">
-            <a:avLst/>
-          </a:prstGeom>
-        </p:spPr>
-        <p:txBody>
-          <a:bodyPr spcFirstLastPara="1" wrap="square" lIns="91425" tIns="91425" rIns="91425" bIns="91425" anchor="t" anchorCtr="0">
-            <a:normAutofit fontScale="90000"/>
-          </a:bodyPr>
-          <a:lstStyle/>
-          <a:p>
-            <a:pPr marL="0" lvl="0" indent="0" algn="l" rtl="0">
-              <a:spcBef>
-                <a:spcPts val="0"/>
-              </a:spcBef>
-              <a:spcAft>
-                <a:spcPts val="0"/>
-              </a:spcAft>
-              <a:buNone/>
-            </a:pPr>
-            <a:r>
-              <a:rPr lang="en" dirty="0">
-                <a:latin typeface="Arial" panose="020B0604020202020204" pitchFamily="34" charset="0"/>
-                <a:cs typeface="Arial" panose="020B0604020202020204" pitchFamily="34" charset="0"/>
-              </a:rPr>
-              <a:t>2) Analyses – Model Accuracy Scores</a:t>
-            </a:r>
-            <a:endParaRPr dirty="0">
-              <a:latin typeface="Arial" panose="020B0604020202020204" pitchFamily="34" charset="0"/>
-              <a:cs typeface="Arial" panose="020B0604020202020204" pitchFamily="34" charset="0"/>
-            </a:endParaRPr>
-          </a:p>
-        </p:txBody>
-      </p:sp>
-      <p:graphicFrame>
-        <p:nvGraphicFramePr>
-          <p:cNvPr id="15" name="Table 14">
-            <a:extLst>
-              <a:ext uri="{FF2B5EF4-FFF2-40B4-BE49-F238E27FC236}">
-                <a16:creationId xmlns:a16="http://schemas.microsoft.com/office/drawing/2014/main" id="{5D325089-31BF-64ED-86BC-9F3FCDE0D064}"/>
-              </a:ext>
-            </a:extLst>
-          </p:cNvPr>
-          <p:cNvGraphicFramePr>
-            <a:graphicFrameLocks noGrp="1"/>
-          </p:cNvGraphicFramePr>
-          <p:nvPr>
-            <p:extLst>
-              <p:ext uri="{D42A27DB-BD31-4B8C-83A1-F6EECF244321}">
-                <p14:modId xmlns:p14="http://schemas.microsoft.com/office/powerpoint/2010/main" val="1076934197"/>
-              </p:ext>
-            </p:extLst>
-          </p:nvPr>
-        </p:nvGraphicFramePr>
-        <p:xfrm>
-          <a:off x="2601468" y="1070187"/>
-          <a:ext cx="3941064" cy="3657600"/>
-        </p:xfrm>
-        <a:graphic>
-          <a:graphicData uri="http://schemas.openxmlformats.org/drawingml/2006/table">
-            <a:tbl>
-              <a:tblPr firstRow="1" bandRow="1">
-                <a:tableStyleId>{9D7B26C5-4107-4FEC-AEDC-1716B250A1EF}</a:tableStyleId>
-              </a:tblPr>
-              <a:tblGrid>
-                <a:gridCol w="2194560">
-                  <a:extLst>
-                    <a:ext uri="{9D8B030D-6E8A-4147-A177-3AD203B41FA5}">
-                      <a16:colId xmlns:a16="http://schemas.microsoft.com/office/drawing/2014/main" val="2012366367"/>
-                    </a:ext>
-                  </a:extLst>
-                </a:gridCol>
-                <a:gridCol w="1746504">
-                  <a:extLst>
-                    <a:ext uri="{9D8B030D-6E8A-4147-A177-3AD203B41FA5}">
-                      <a16:colId xmlns:a16="http://schemas.microsoft.com/office/drawing/2014/main" val="3006864667"/>
-                    </a:ext>
-                  </a:extLst>
-                </a:gridCol>
-              </a:tblGrid>
-              <a:tr h="365760">
-                <a:tc>
-                  <a:txBody>
-                    <a:bodyPr/>
-                    <a:lstStyle/>
-                    <a:p>
-                      <a:pPr algn="ctr"/>
-                      <a:r>
-                        <a:rPr lang="en-US" sz="1200" dirty="0">
-                          <a:solidFill>
-                            <a:schemeClr val="tx1"/>
-                          </a:solidFill>
-                          <a:latin typeface="Arial" panose="020B0604020202020204" pitchFamily="34" charset="0"/>
-                          <a:cs typeface="Arial" panose="020B0604020202020204" pitchFamily="34" charset="0"/>
-                        </a:rPr>
-                        <a:t>Model</a:t>
-                      </a:r>
-                    </a:p>
-                  </a:txBody>
-                  <a:tcPr anchor="ctr"/>
-                </a:tc>
-                <a:tc>
-                  <a:txBody>
-                    <a:bodyPr/>
-                    <a:lstStyle/>
-                    <a:p>
-                      <a:pPr algn="ctr"/>
-                      <a:r>
-                        <a:rPr lang="en-US" sz="1200" dirty="0">
-                          <a:solidFill>
-                            <a:schemeClr val="tx1"/>
-                          </a:solidFill>
-                          <a:latin typeface="Arial" panose="020B0604020202020204" pitchFamily="34" charset="0"/>
-                          <a:cs typeface="Arial" panose="020B0604020202020204" pitchFamily="34" charset="0"/>
-                        </a:rPr>
-                        <a:t>As-Is Dataset</a:t>
-                      </a:r>
-                    </a:p>
-                  </a:txBody>
-                  <a:tcPr anchor="ctr"/>
-                </a:tc>
-                <a:extLst>
-                  <a:ext uri="{0D108BD9-81ED-4DB2-BD59-A6C34878D82A}">
-                    <a16:rowId xmlns:a16="http://schemas.microsoft.com/office/drawing/2014/main" val="4077809550"/>
-                  </a:ext>
-                </a:extLst>
-              </a:tr>
-              <a:tr h="365760">
-                <a:tc>
-                  <a:txBody>
-                    <a:bodyPr/>
-                    <a:lstStyle/>
-                    <a:p>
-                      <a:r>
-                        <a:rPr lang="en-US" sz="1200" dirty="0">
-                          <a:solidFill>
-                            <a:schemeClr val="tx1"/>
-                          </a:solidFill>
-                          <a:latin typeface="Arial" panose="020B0604020202020204" pitchFamily="34" charset="0"/>
-                          <a:cs typeface="Arial" panose="020B0604020202020204" pitchFamily="34" charset="0"/>
-                        </a:rPr>
-                        <a:t>Logistic Regression</a:t>
-                      </a:r>
-                    </a:p>
-                  </a:txBody>
-                  <a:tcPr anchor="ctr"/>
-                </a:tc>
-                <a:tc>
-                  <a:txBody>
-                    <a:bodyPr/>
-                    <a:lstStyle/>
-                    <a:p>
-                      <a:pPr algn="ctr"/>
-                      <a:r>
-                        <a:rPr lang="en-US" sz="1200" dirty="0">
-                          <a:solidFill>
-                            <a:schemeClr val="tx1"/>
-                          </a:solidFill>
-                          <a:latin typeface="Arial" panose="020B0604020202020204" pitchFamily="34" charset="0"/>
-                          <a:cs typeface="Arial" panose="020B0604020202020204" pitchFamily="34" charset="0"/>
-                        </a:rPr>
-                        <a:t>0.79</a:t>
-                      </a:r>
-                    </a:p>
-                  </a:txBody>
-                  <a:tcPr anchor="ctr"/>
-                </a:tc>
-                <a:extLst>
-                  <a:ext uri="{0D108BD9-81ED-4DB2-BD59-A6C34878D82A}">
-                    <a16:rowId xmlns:a16="http://schemas.microsoft.com/office/drawing/2014/main" val="3120605027"/>
-                  </a:ext>
-                </a:extLst>
-              </a:tr>
-              <a:tr h="365760">
-                <a:tc>
-                  <a:txBody>
-                    <a:bodyPr/>
-                    <a:lstStyle/>
-                    <a:p>
-                      <a:r>
-                        <a:rPr lang="en-US" sz="1200" dirty="0">
-                          <a:solidFill>
-                            <a:schemeClr val="tx1"/>
-                          </a:solidFill>
-                          <a:latin typeface="Arial" panose="020B0604020202020204" pitchFamily="34" charset="0"/>
-                          <a:cs typeface="Arial" panose="020B0604020202020204" pitchFamily="34" charset="0"/>
-                        </a:rPr>
-                        <a:t>K-Nearest Neighbors</a:t>
-                      </a:r>
-                    </a:p>
-                  </a:txBody>
-                  <a:tcPr anchor="ctr"/>
-                </a:tc>
-                <a:tc>
-                  <a:txBody>
-                    <a:bodyPr/>
-                    <a:lstStyle/>
-                    <a:p>
-                      <a:pPr algn="ctr"/>
-                      <a:r>
-                        <a:rPr lang="en-US" sz="1200" dirty="0">
-                          <a:solidFill>
-                            <a:schemeClr val="tx1"/>
-                          </a:solidFill>
-                          <a:latin typeface="Arial" panose="020B0604020202020204" pitchFamily="34" charset="0"/>
-                          <a:cs typeface="Arial" panose="020B0604020202020204" pitchFamily="34" charset="0"/>
-                        </a:rPr>
-                        <a:t>0.83</a:t>
-                      </a:r>
-                    </a:p>
-                  </a:txBody>
-                  <a:tcPr anchor="ctr"/>
-                </a:tc>
-                <a:extLst>
-                  <a:ext uri="{0D108BD9-81ED-4DB2-BD59-A6C34878D82A}">
-                    <a16:rowId xmlns:a16="http://schemas.microsoft.com/office/drawing/2014/main" val="2727219094"/>
-                  </a:ext>
-                </a:extLst>
-              </a:tr>
-              <a:tr h="365760">
-                <a:tc>
-                  <a:txBody>
-                    <a:bodyPr/>
-                    <a:lstStyle/>
-                    <a:p>
-                      <a:r>
-                        <a:rPr lang="en-US" sz="1200" dirty="0">
-                          <a:solidFill>
-                            <a:schemeClr val="tx1"/>
-                          </a:solidFill>
-                          <a:latin typeface="Arial" panose="020B0604020202020204" pitchFamily="34" charset="0"/>
-                          <a:cs typeface="Arial" panose="020B0604020202020204" pitchFamily="34" charset="0"/>
-                        </a:rPr>
-                        <a:t>Decision Tree</a:t>
-                      </a:r>
-                    </a:p>
-                  </a:txBody>
-                  <a:tcPr anchor="ctr"/>
-                </a:tc>
-                <a:tc>
-                  <a:txBody>
-                    <a:bodyPr/>
-                    <a:lstStyle/>
-                    <a:p>
-                      <a:pPr algn="ctr"/>
-                      <a:r>
-                        <a:rPr lang="en-US" sz="1200" dirty="0">
-                          <a:solidFill>
-                            <a:schemeClr val="tx1"/>
-                          </a:solidFill>
-                          <a:latin typeface="Arial" panose="020B0604020202020204" pitchFamily="34" charset="0"/>
-                          <a:cs typeface="Arial" panose="020B0604020202020204" pitchFamily="34" charset="0"/>
-                        </a:rPr>
-                        <a:t>0.90</a:t>
-                      </a:r>
-                    </a:p>
-                  </a:txBody>
-                  <a:tcPr anchor="ctr"/>
-                </a:tc>
-                <a:extLst>
-                  <a:ext uri="{0D108BD9-81ED-4DB2-BD59-A6C34878D82A}">
-                    <a16:rowId xmlns:a16="http://schemas.microsoft.com/office/drawing/2014/main" val="826801147"/>
-                  </a:ext>
-                </a:extLst>
-              </a:tr>
-              <a:tr h="365760">
-                <a:tc>
-                  <a:txBody>
-                    <a:bodyPr/>
-                    <a:lstStyle/>
-                    <a:p>
-                      <a:r>
-                        <a:rPr lang="en-US" sz="1200" dirty="0">
-                          <a:solidFill>
-                            <a:schemeClr val="tx1"/>
-                          </a:solidFill>
-                          <a:latin typeface="Arial" panose="020B0604020202020204" pitchFamily="34" charset="0"/>
-                          <a:cs typeface="Arial" panose="020B0604020202020204" pitchFamily="34" charset="0"/>
-                        </a:rPr>
-                        <a:t>Random Forest</a:t>
-                      </a:r>
-                    </a:p>
-                  </a:txBody>
-                  <a:tcPr anchor="ctr"/>
-                </a:tc>
-                <a:tc>
-                  <a:txBody>
-                    <a:bodyPr/>
-                    <a:lstStyle/>
-                    <a:p>
-                      <a:pPr algn="ctr"/>
-                      <a:r>
-                        <a:rPr lang="en-US" sz="1200" dirty="0">
-                          <a:solidFill>
-                            <a:schemeClr val="tx1"/>
-                          </a:solidFill>
-                          <a:latin typeface="Arial" panose="020B0604020202020204" pitchFamily="34" charset="0"/>
-                          <a:cs typeface="Arial" panose="020B0604020202020204" pitchFamily="34" charset="0"/>
-                        </a:rPr>
-                        <a:t>0.89</a:t>
-                      </a:r>
-                    </a:p>
-                  </a:txBody>
-                  <a:tcPr anchor="ctr"/>
-                </a:tc>
-                <a:extLst>
-                  <a:ext uri="{0D108BD9-81ED-4DB2-BD59-A6C34878D82A}">
-                    <a16:rowId xmlns:a16="http://schemas.microsoft.com/office/drawing/2014/main" val="2532402893"/>
-                  </a:ext>
-                </a:extLst>
-              </a:tr>
-              <a:tr h="365760">
-                <a:tc>
-                  <a:txBody>
-                    <a:bodyPr/>
-                    <a:lstStyle/>
-                    <a:p>
-                      <a:r>
-                        <a:rPr lang="en-US" sz="1200" dirty="0">
-                          <a:solidFill>
-                            <a:schemeClr val="tx1"/>
-                          </a:solidFill>
-                          <a:latin typeface="Arial" panose="020B0604020202020204" pitchFamily="34" charset="0"/>
-                          <a:cs typeface="Arial" panose="020B0604020202020204" pitchFamily="34" charset="0"/>
-                        </a:rPr>
-                        <a:t>Extremely Random Trees</a:t>
-                      </a:r>
-                    </a:p>
-                  </a:txBody>
-                  <a:tcPr anchor="ctr"/>
-                </a:tc>
-                <a:tc>
-                  <a:txBody>
-                    <a:bodyPr/>
-                    <a:lstStyle/>
-                    <a:p>
-                      <a:pPr algn="ctr"/>
-                      <a:r>
-                        <a:rPr lang="en-US" sz="1200" dirty="0">
-                          <a:solidFill>
-                            <a:schemeClr val="tx1"/>
-                          </a:solidFill>
-                          <a:latin typeface="Arial" panose="020B0604020202020204" pitchFamily="34" charset="0"/>
-                          <a:cs typeface="Arial" panose="020B0604020202020204" pitchFamily="34" charset="0"/>
-                        </a:rPr>
-                        <a:t>0.88</a:t>
-                      </a:r>
-                    </a:p>
-                  </a:txBody>
-                  <a:tcPr anchor="ctr"/>
-                </a:tc>
-                <a:extLst>
-                  <a:ext uri="{0D108BD9-81ED-4DB2-BD59-A6C34878D82A}">
-                    <a16:rowId xmlns:a16="http://schemas.microsoft.com/office/drawing/2014/main" val="3803779599"/>
-                  </a:ext>
-                </a:extLst>
-              </a:tr>
-              <a:tr h="365760">
-                <a:tc>
-                  <a:txBody>
-                    <a:bodyPr/>
-                    <a:lstStyle/>
-                    <a:p>
-                      <a:r>
-                        <a:rPr lang="en-US" sz="1200" dirty="0">
-                          <a:solidFill>
-                            <a:schemeClr val="tx1"/>
-                          </a:solidFill>
-                          <a:latin typeface="Arial" panose="020B0604020202020204" pitchFamily="34" charset="0"/>
-                          <a:cs typeface="Arial" panose="020B0604020202020204" pitchFamily="34" charset="0"/>
-                        </a:rPr>
-                        <a:t>Gradient Boosting</a:t>
-                      </a:r>
-                    </a:p>
-                  </a:txBody>
-                  <a:tcPr anchor="ctr"/>
-                </a:tc>
-                <a:tc>
-                  <a:txBody>
-                    <a:bodyPr/>
-                    <a:lstStyle/>
-                    <a:p>
-                      <a:pPr algn="ctr"/>
-                      <a:r>
-                        <a:rPr lang="en-US" sz="1200" dirty="0">
-                          <a:solidFill>
-                            <a:schemeClr val="tx1"/>
-                          </a:solidFill>
-                          <a:latin typeface="Arial" panose="020B0604020202020204" pitchFamily="34" charset="0"/>
-                          <a:cs typeface="Arial" panose="020B0604020202020204" pitchFamily="34" charset="0"/>
-                        </a:rPr>
-                        <a:t>0.88</a:t>
-                      </a:r>
-                    </a:p>
-                  </a:txBody>
-                  <a:tcPr anchor="ctr"/>
-                </a:tc>
-                <a:extLst>
-                  <a:ext uri="{0D108BD9-81ED-4DB2-BD59-A6C34878D82A}">
-                    <a16:rowId xmlns:a16="http://schemas.microsoft.com/office/drawing/2014/main" val="1456921428"/>
-                  </a:ext>
-                </a:extLst>
-              </a:tr>
-              <a:tr h="365760">
-                <a:tc>
-                  <a:txBody>
-                    <a:bodyPr/>
-                    <a:lstStyle/>
-                    <a:p>
-                      <a:r>
-                        <a:rPr lang="en-US" sz="1200" dirty="0">
-                          <a:solidFill>
-                            <a:schemeClr val="tx1"/>
-                          </a:solidFill>
-                          <a:latin typeface="Arial" panose="020B0604020202020204" pitchFamily="34" charset="0"/>
-                          <a:cs typeface="Arial" panose="020B0604020202020204" pitchFamily="34" charset="0"/>
-                        </a:rPr>
-                        <a:t>AdaBoost</a:t>
-                      </a:r>
-                    </a:p>
-                  </a:txBody>
-                  <a:tcPr anchor="ctr"/>
-                </a:tc>
-                <a:tc>
-                  <a:txBody>
-                    <a:bodyPr/>
-                    <a:lstStyle/>
-                    <a:p>
-                      <a:pPr algn="ctr"/>
-                      <a:r>
-                        <a:rPr lang="en-US" sz="1200" dirty="0">
-                          <a:solidFill>
-                            <a:schemeClr val="tx1"/>
-                          </a:solidFill>
-                          <a:latin typeface="Arial" panose="020B0604020202020204" pitchFamily="34" charset="0"/>
-                          <a:cs typeface="Arial" panose="020B0604020202020204" pitchFamily="34" charset="0"/>
-                        </a:rPr>
-                        <a:t>0.87</a:t>
-                      </a:r>
-                    </a:p>
-                  </a:txBody>
-                  <a:tcPr anchor="ctr"/>
-                </a:tc>
-                <a:extLst>
-                  <a:ext uri="{0D108BD9-81ED-4DB2-BD59-A6C34878D82A}">
-                    <a16:rowId xmlns:a16="http://schemas.microsoft.com/office/drawing/2014/main" val="730200898"/>
-                  </a:ext>
-                </a:extLst>
-              </a:tr>
-              <a:tr h="365760">
-                <a:tc>
-                  <a:txBody>
-                    <a:bodyPr/>
-                    <a:lstStyle/>
-                    <a:p>
-                      <a:r>
-                        <a:rPr lang="en-US" sz="1200" dirty="0">
-                          <a:solidFill>
-                            <a:schemeClr val="tx1"/>
-                          </a:solidFill>
-                          <a:latin typeface="Arial" panose="020B0604020202020204" pitchFamily="34" charset="0"/>
-                          <a:cs typeface="Arial" panose="020B0604020202020204" pitchFamily="34" charset="0"/>
-                        </a:rPr>
-                        <a:t>Support Vector Machine</a:t>
-                      </a:r>
-                    </a:p>
-                  </a:txBody>
-                  <a:tcPr anchor="ctr"/>
-                </a:tc>
-                <a:tc>
-                  <a:txBody>
-                    <a:bodyPr/>
-                    <a:lstStyle/>
-                    <a:p>
-                      <a:pPr algn="ctr"/>
-                      <a:r>
-                        <a:rPr lang="en-US" sz="1200" dirty="0">
-                          <a:solidFill>
-                            <a:schemeClr val="tx1"/>
-                          </a:solidFill>
-                          <a:latin typeface="Arial" panose="020B0604020202020204" pitchFamily="34" charset="0"/>
-                          <a:cs typeface="Arial" panose="020B0604020202020204" pitchFamily="34" charset="0"/>
-                        </a:rPr>
-                        <a:t>0.86</a:t>
-                      </a:r>
-                    </a:p>
-                  </a:txBody>
-                  <a:tcPr anchor="ctr"/>
-                </a:tc>
-                <a:extLst>
-                  <a:ext uri="{0D108BD9-81ED-4DB2-BD59-A6C34878D82A}">
-                    <a16:rowId xmlns:a16="http://schemas.microsoft.com/office/drawing/2014/main" val="2813182878"/>
-                  </a:ext>
-                </a:extLst>
-              </a:tr>
-              <a:tr h="365760">
-                <a:tc>
-                  <a:txBody>
-                    <a:bodyPr/>
-                    <a:lstStyle/>
-                    <a:p>
-                      <a:r>
-                        <a:rPr lang="en-US" sz="1200" dirty="0">
-                          <a:solidFill>
-                            <a:schemeClr val="tx1"/>
-                          </a:solidFill>
-                          <a:latin typeface="Arial" panose="020B0604020202020204" pitchFamily="34" charset="0"/>
-                          <a:cs typeface="Arial" panose="020B0604020202020204" pitchFamily="34" charset="0"/>
-                        </a:rPr>
-                        <a:t>Naïve Bayes</a:t>
-                      </a:r>
-                    </a:p>
-                  </a:txBody>
-                  <a:tcPr anchor="ctr"/>
-                </a:tc>
-                <a:tc>
-                  <a:txBody>
-                    <a:bodyPr/>
-                    <a:lstStyle/>
-                    <a:p>
-                      <a:pPr algn="ctr"/>
-                      <a:r>
-                        <a:rPr lang="en-US" sz="1200" dirty="0">
-                          <a:solidFill>
-                            <a:schemeClr val="tx1"/>
-                          </a:solidFill>
-                          <a:latin typeface="Arial" panose="020B0604020202020204" pitchFamily="34" charset="0"/>
-                          <a:cs typeface="Arial" panose="020B0604020202020204" pitchFamily="34" charset="0"/>
-                        </a:rPr>
-                        <a:t>0.80</a:t>
-                      </a:r>
-                    </a:p>
-                  </a:txBody>
-                  <a:tcPr anchor="ctr"/>
-                </a:tc>
-                <a:extLst>
-                  <a:ext uri="{0D108BD9-81ED-4DB2-BD59-A6C34878D82A}">
-                    <a16:rowId xmlns:a16="http://schemas.microsoft.com/office/drawing/2014/main" val="846358564"/>
-                  </a:ext>
-                </a:extLst>
-              </a:tr>
-            </a:tbl>
-          </a:graphicData>
-        </a:graphic>
-      </p:graphicFrame>
-    </p:spTree>
-    <p:extLst>
-      <p:ext uri="{BB962C8B-B14F-4D97-AF65-F5344CB8AC3E}">
-        <p14:creationId xmlns:p14="http://schemas.microsoft.com/office/powerpoint/2010/main" val="2090394132"/>
-      </p:ext>
-    </p:extLst>
-  </p:cSld>
-  <p:clrMapOvr>
-    <a:masterClrMapping/>
-  </p:clrMapOvr>
-</p:sld>
-</file>
-
-<file path=ppt/slides/slide7.xml><?xml version="1.0" encoding="utf-8"?>
 <p:sld xmlns:a="http://schemas.openxmlformats.org/drawingml/2006/main" xmlns:r="http://schemas.openxmlformats.org/officeDocument/2006/relationships" xmlns:p="http://schemas.openxmlformats.org/presentationml/2006/main">
   <p:cSld>
     <p:bg>
@@ -13491,7 +11712,7 @@
 </p:sld>
 </file>
 
-<file path=ppt/slides/slide8.xml><?xml version="1.0" encoding="utf-8"?>
+<file path=ppt/slides/slide7.xml><?xml version="1.0" encoding="utf-8"?>
 <p:sld xmlns:a="http://schemas.openxmlformats.org/drawingml/2006/main" xmlns:r="http://schemas.openxmlformats.org/officeDocument/2006/relationships" xmlns:p="http://schemas.openxmlformats.org/presentationml/2006/main">
   <p:cSld>
     <p:bg>
@@ -15935,7 +14156,7 @@
 </p:sld>
 </file>
 
-<file path=ppt/slides/slide9.xml><?xml version="1.0" encoding="utf-8"?>
+<file path=ppt/slides/slide8.xml><?xml version="1.0" encoding="utf-8"?>
 <p:sld xmlns:a="http://schemas.openxmlformats.org/drawingml/2006/main" xmlns:r="http://schemas.openxmlformats.org/officeDocument/2006/relationships" xmlns:p="http://schemas.openxmlformats.org/presentationml/2006/main">
   <p:cSld>
     <p:bg>
@@ -16324,6 +14545,593 @@
         <p14:creationId xmlns:p14="http://schemas.microsoft.com/office/powerpoint/2010/main" val="2720268968"/>
       </p:ext>
     </p:extLst>
+  </p:cSld>
+  <p:clrMapOvr>
+    <a:masterClrMapping/>
+  </p:clrMapOvr>
+</p:sld>
+</file>
+
+<file path=ppt/slides/slide9.xml><?xml version="1.0" encoding="utf-8"?>
+<p:sld xmlns:a="http://schemas.openxmlformats.org/drawingml/2006/main" xmlns:r="http://schemas.openxmlformats.org/officeDocument/2006/relationships" xmlns:p="http://schemas.openxmlformats.org/presentationml/2006/main">
+  <p:cSld>
+    <p:bg>
+      <p:bgPr>
+        <a:solidFill>
+          <a:schemeClr val="bg1"/>
+        </a:solidFill>
+        <a:effectLst/>
+      </p:bgPr>
+    </p:bg>
+    <p:spTree>
+      <p:nvGrpSpPr>
+        <p:cNvPr id="1" name="Shape 240"/>
+        <p:cNvGrpSpPr/>
+        <p:nvPr/>
+      </p:nvGrpSpPr>
+      <p:grpSpPr>
+        <a:xfrm>
+          <a:off x="0" y="0"/>
+          <a:ext cx="0" cy="0"/>
+          <a:chOff x="0" y="0"/>
+          <a:chExt cx="0" cy="0"/>
+        </a:xfrm>
+      </p:grpSpPr>
+      <p:sp useBgFill="1">
+        <p:nvSpPr>
+          <p:cNvPr id="248" name="Rectangle 247">
+            <a:extLst>
+              <a:ext uri="{FF2B5EF4-FFF2-40B4-BE49-F238E27FC236}">
+                <a16:creationId xmlns:a16="http://schemas.microsoft.com/office/drawing/2014/main" id="{F13C74B1-5B17-4795-BED0-7140497B445A}"/>
+              </a:ext>
+              <a:ext uri="{C183D7F6-B498-43B3-948B-1728B52AA6E4}">
+                <adec:decorative xmlns:adec="http://schemas.microsoft.com/office/drawing/2017/decorative" val="1"/>
+              </a:ext>
+            </a:extLst>
+          </p:cNvPr>
+          <p:cNvSpPr>
+            <a:spLocks noGrp="1" noRot="1" noChangeAspect="1" noMove="1" noResize="1" noEditPoints="1" noAdjustHandles="1" noChangeArrowheads="1" noChangeShapeType="1" noTextEdit="1"/>
+          </p:cNvSpPr>
+          <p:nvPr>
+            <p:extLst>
+              <p:ext uri="{386F3935-93C4-4BCD-93E2-E3B085C9AB24}">
+                <p16:designElem xmlns:p16="http://schemas.microsoft.com/office/powerpoint/2015/main" val="1"/>
+              </p:ext>
+            </p:extLst>
+          </p:nvPr>
+        </p:nvSpPr>
+        <p:spPr>
+          <a:xfrm>
+            <a:off x="0" y="0"/>
+            <a:ext cx="9141714" cy="5143500"/>
+          </a:xfrm>
+          <a:prstGeom prst="rect">
+            <a:avLst/>
+          </a:prstGeom>
+          <a:ln>
+            <a:noFill/>
+          </a:ln>
+        </p:spPr>
+        <p:style>
+          <a:lnRef idx="2">
+            <a:schemeClr val="accent1">
+              <a:shade val="50000"/>
+            </a:schemeClr>
+          </a:lnRef>
+          <a:fillRef idx="1">
+            <a:schemeClr val="accent1"/>
+          </a:fillRef>
+          <a:effectRef idx="0">
+            <a:schemeClr val="accent1"/>
+          </a:effectRef>
+          <a:fontRef idx="minor">
+            <a:schemeClr val="lt1"/>
+          </a:fontRef>
+        </p:style>
+        <p:txBody>
+          <a:bodyPr rtlCol="0" anchor="ctr"/>
+          <a:lstStyle/>
+          <a:p>
+            <a:pPr algn="ctr"/>
+            <a:endParaRPr lang="en-US"/>
+          </a:p>
+        </p:txBody>
+      </p:sp>
+      <p:sp>
+        <p:nvSpPr>
+          <p:cNvPr id="241" name="Google Shape;241;p24"/>
+          <p:cNvSpPr txBox="1">
+            <a:spLocks noGrp="1"/>
+          </p:cNvSpPr>
+          <p:nvPr>
+            <p:ph type="title"/>
+          </p:nvPr>
+        </p:nvSpPr>
+        <p:spPr>
+          <a:xfrm>
+            <a:off x="480060" y="244026"/>
+            <a:ext cx="3276451" cy="1467631"/>
+          </a:xfrm>
+          <a:prstGeom prst="rect">
+            <a:avLst/>
+          </a:prstGeom>
+        </p:spPr>
+        <p:txBody>
+          <a:bodyPr spcFirstLastPara="1" vert="horz" lIns="91440" tIns="45720" rIns="91440" bIns="45720" rtlCol="0" anchor="b" anchorCtr="0">
+            <a:normAutofit/>
+          </a:bodyPr>
+          <a:lstStyle/>
+          <a:p>
+            <a:pPr marL="0" lvl="0" indent="0" algn="l" defTabSz="914400">
+              <a:spcBef>
+                <a:spcPct val="0"/>
+              </a:spcBef>
+              <a:spcAft>
+                <a:spcPts val="0"/>
+              </a:spcAft>
+            </a:pPr>
+            <a:r>
+              <a:rPr lang="en-US" sz="4100">
+                <a:solidFill>
+                  <a:schemeClr val="tx1"/>
+                </a:solidFill>
+              </a:rPr>
+              <a:t>Fin</a:t>
+            </a:r>
+          </a:p>
+        </p:txBody>
+      </p:sp>
+      <p:sp>
+        <p:nvSpPr>
+          <p:cNvPr id="250" name="sketchy line">
+            <a:extLst>
+              <a:ext uri="{FF2B5EF4-FFF2-40B4-BE49-F238E27FC236}">
+                <a16:creationId xmlns:a16="http://schemas.microsoft.com/office/drawing/2014/main" id="{D4974D33-8DC5-464E-8C6D-BE58F0669C17}"/>
+              </a:ext>
+              <a:ext uri="{C183D7F6-B498-43B3-948B-1728B52AA6E4}">
+                <adec:decorative xmlns:adec="http://schemas.microsoft.com/office/drawing/2017/decorative" val="1"/>
+              </a:ext>
+            </a:extLst>
+          </p:cNvPr>
+          <p:cNvSpPr>
+            <a:spLocks noGrp="1" noRot="1" noChangeAspect="1" noMove="1" noResize="1" noEditPoints="1" noAdjustHandles="1" noChangeArrowheads="1" noChangeShapeType="1" noTextEdit="1"/>
+          </p:cNvSpPr>
+          <p:nvPr>
+            <p:extLst>
+              <p:ext uri="{386F3935-93C4-4BCD-93E2-E3B085C9AB24}">
+                <p16:designElem xmlns:p16="http://schemas.microsoft.com/office/powerpoint/2015/main" val="1"/>
+              </p:ext>
+            </p:extLst>
+          </p:nvPr>
+        </p:nvSpPr>
+        <p:spPr>
+          <a:xfrm>
+            <a:off x="480060" y="1940245"/>
+            <a:ext cx="2606040" cy="13716"/>
+          </a:xfrm>
+          <a:custGeom>
+            <a:avLst/>
+            <a:gdLst>
+              <a:gd name="connsiteX0" fmla="*/ 0 w 2606040"/>
+              <a:gd name="connsiteY0" fmla="*/ 0 h 13716"/>
+              <a:gd name="connsiteX1" fmla="*/ 625450 w 2606040"/>
+              <a:gd name="connsiteY1" fmla="*/ 0 h 13716"/>
+              <a:gd name="connsiteX2" fmla="*/ 1224839 w 2606040"/>
+              <a:gd name="connsiteY2" fmla="*/ 0 h 13716"/>
+              <a:gd name="connsiteX3" fmla="*/ 1824228 w 2606040"/>
+              <a:gd name="connsiteY3" fmla="*/ 0 h 13716"/>
+              <a:gd name="connsiteX4" fmla="*/ 2606040 w 2606040"/>
+              <a:gd name="connsiteY4" fmla="*/ 0 h 13716"/>
+              <a:gd name="connsiteX5" fmla="*/ 2606040 w 2606040"/>
+              <a:gd name="connsiteY5" fmla="*/ 13716 h 13716"/>
+              <a:gd name="connsiteX6" fmla="*/ 1902409 w 2606040"/>
+              <a:gd name="connsiteY6" fmla="*/ 13716 h 13716"/>
+              <a:gd name="connsiteX7" fmla="*/ 1276960 w 2606040"/>
+              <a:gd name="connsiteY7" fmla="*/ 13716 h 13716"/>
+              <a:gd name="connsiteX8" fmla="*/ 677570 w 2606040"/>
+              <a:gd name="connsiteY8" fmla="*/ 13716 h 13716"/>
+              <a:gd name="connsiteX9" fmla="*/ 0 w 2606040"/>
+              <a:gd name="connsiteY9" fmla="*/ 13716 h 13716"/>
+              <a:gd name="connsiteX10" fmla="*/ 0 w 2606040"/>
+              <a:gd name="connsiteY10" fmla="*/ 0 h 13716"/>
+            </a:gdLst>
+            <a:ahLst/>
+            <a:cxnLst>
+              <a:cxn ang="0">
+                <a:pos x="connsiteX0" y="connsiteY0"/>
+              </a:cxn>
+              <a:cxn ang="0">
+                <a:pos x="connsiteX1" y="connsiteY1"/>
+              </a:cxn>
+              <a:cxn ang="0">
+                <a:pos x="connsiteX2" y="connsiteY2"/>
+              </a:cxn>
+              <a:cxn ang="0">
+                <a:pos x="connsiteX3" y="connsiteY3"/>
+              </a:cxn>
+              <a:cxn ang="0">
+                <a:pos x="connsiteX4" y="connsiteY4"/>
+              </a:cxn>
+              <a:cxn ang="0">
+                <a:pos x="connsiteX5" y="connsiteY5"/>
+              </a:cxn>
+              <a:cxn ang="0">
+                <a:pos x="connsiteX6" y="connsiteY6"/>
+              </a:cxn>
+              <a:cxn ang="0">
+                <a:pos x="connsiteX7" y="connsiteY7"/>
+              </a:cxn>
+              <a:cxn ang="0">
+                <a:pos x="connsiteX8" y="connsiteY8"/>
+              </a:cxn>
+              <a:cxn ang="0">
+                <a:pos x="connsiteX9" y="connsiteY9"/>
+              </a:cxn>
+              <a:cxn ang="0">
+                <a:pos x="connsiteX10" y="connsiteY10"/>
+              </a:cxn>
+            </a:cxnLst>
+            <a:rect l="l" t="t" r="r" b="b"/>
+            <a:pathLst>
+              <a:path w="2606040" h="13716" fill="none" extrusionOk="0">
+                <a:moveTo>
+                  <a:pt x="0" y="0"/>
+                </a:moveTo>
+                <a:cubicBezTo>
+                  <a:pt x="266776" y="-600"/>
+                  <a:pt x="322756" y="3201"/>
+                  <a:pt x="625450" y="0"/>
+                </a:cubicBezTo>
+                <a:cubicBezTo>
+                  <a:pt x="928144" y="-3201"/>
+                  <a:pt x="968141" y="9269"/>
+                  <a:pt x="1224839" y="0"/>
+                </a:cubicBezTo>
+                <a:cubicBezTo>
+                  <a:pt x="1481537" y="-9269"/>
+                  <a:pt x="1569059" y="21947"/>
+                  <a:pt x="1824228" y="0"/>
+                </a:cubicBezTo>
+                <a:cubicBezTo>
+                  <a:pt x="2079397" y="-21947"/>
+                  <a:pt x="2326053" y="-10194"/>
+                  <a:pt x="2606040" y="0"/>
+                </a:cubicBezTo>
+                <a:cubicBezTo>
+                  <a:pt x="2605690" y="5728"/>
+                  <a:pt x="2605650" y="7624"/>
+                  <a:pt x="2606040" y="13716"/>
+                </a:cubicBezTo>
+                <a:cubicBezTo>
+                  <a:pt x="2256758" y="26838"/>
+                  <a:pt x="2173673" y="-17450"/>
+                  <a:pt x="1902409" y="13716"/>
+                </a:cubicBezTo>
+                <a:cubicBezTo>
+                  <a:pt x="1631145" y="44882"/>
+                  <a:pt x="1461378" y="894"/>
+                  <a:pt x="1276960" y="13716"/>
+                </a:cubicBezTo>
+                <a:cubicBezTo>
+                  <a:pt x="1092542" y="26538"/>
+                  <a:pt x="890442" y="8641"/>
+                  <a:pt x="677570" y="13716"/>
+                </a:cubicBezTo>
+                <a:cubicBezTo>
+                  <a:pt x="464698" y="18792"/>
+                  <a:pt x="187648" y="31265"/>
+                  <a:pt x="0" y="13716"/>
+                </a:cubicBezTo>
+                <a:cubicBezTo>
+                  <a:pt x="-302" y="10335"/>
+                  <a:pt x="417" y="4724"/>
+                  <a:pt x="0" y="0"/>
+                </a:cubicBezTo>
+                <a:close/>
+              </a:path>
+              <a:path w="2606040" h="13716" stroke="0" extrusionOk="0">
+                <a:moveTo>
+                  <a:pt x="0" y="0"/>
+                </a:moveTo>
+                <a:cubicBezTo>
+                  <a:pt x="197231" y="3803"/>
+                  <a:pt x="358914" y="-9291"/>
+                  <a:pt x="599389" y="0"/>
+                </a:cubicBezTo>
+                <a:cubicBezTo>
+                  <a:pt x="839864" y="9291"/>
+                  <a:pt x="979371" y="8509"/>
+                  <a:pt x="1303020" y="0"/>
+                </a:cubicBezTo>
+                <a:cubicBezTo>
+                  <a:pt x="1626669" y="-8509"/>
+                  <a:pt x="1726300" y="7440"/>
+                  <a:pt x="1876349" y="0"/>
+                </a:cubicBezTo>
+                <a:cubicBezTo>
+                  <a:pt x="2026398" y="-7440"/>
+                  <a:pt x="2430712" y="17957"/>
+                  <a:pt x="2606040" y="0"/>
+                </a:cubicBezTo>
+                <a:cubicBezTo>
+                  <a:pt x="2606569" y="5071"/>
+                  <a:pt x="2606315" y="7437"/>
+                  <a:pt x="2606040" y="13716"/>
+                </a:cubicBezTo>
+                <a:cubicBezTo>
+                  <a:pt x="2393024" y="-2332"/>
+                  <a:pt x="2191161" y="34687"/>
+                  <a:pt x="1980590" y="13716"/>
+                </a:cubicBezTo>
+                <a:cubicBezTo>
+                  <a:pt x="1770019" y="-7255"/>
+                  <a:pt x="1476440" y="31542"/>
+                  <a:pt x="1276960" y="13716"/>
+                </a:cubicBezTo>
+                <a:cubicBezTo>
+                  <a:pt x="1077480" y="-4110"/>
+                  <a:pt x="880988" y="37553"/>
+                  <a:pt x="651510" y="13716"/>
+                </a:cubicBezTo>
+                <a:cubicBezTo>
+                  <a:pt x="422032" y="-10121"/>
+                  <a:pt x="130744" y="-6519"/>
+                  <a:pt x="0" y="13716"/>
+                </a:cubicBezTo>
+                <a:cubicBezTo>
+                  <a:pt x="198" y="8947"/>
+                  <a:pt x="304" y="5200"/>
+                  <a:pt x="0" y="0"/>
+                </a:cubicBezTo>
+                <a:close/>
+              </a:path>
+            </a:pathLst>
+          </a:custGeom>
+          <a:solidFill>
+            <a:schemeClr val="accent2"/>
+          </a:solidFill>
+          <a:ln w="44450" cap="rnd">
+            <a:solidFill>
+              <a:schemeClr val="accent2"/>
+            </a:solidFill>
+            <a:round/>
+            <a:extLst>
+              <a:ext uri="{C807C97D-BFC1-408E-A445-0C87EB9F89A2}">
+                <ask:lineSketchStyleProps xmlns:ask="http://schemas.microsoft.com/office/drawing/2018/sketchyshapes" sd="2863741219">
+                  <a:prstGeom prst="rect">
+                    <a:avLst/>
+                  </a:prstGeom>
+                  <ask:type>
+                    <ask:lineSketchFreehand/>
+                  </ask:type>
+                </ask:lineSketchStyleProps>
+              </a:ext>
+            </a:extLst>
+          </a:ln>
+        </p:spPr>
+        <p:style>
+          <a:lnRef idx="2">
+            <a:schemeClr val="accent1">
+              <a:shade val="50000"/>
+            </a:schemeClr>
+          </a:lnRef>
+          <a:fillRef idx="1">
+            <a:schemeClr val="accent1"/>
+          </a:fillRef>
+          <a:effectRef idx="0">
+            <a:schemeClr val="accent1"/>
+          </a:effectRef>
+          <a:fontRef idx="minor">
+            <a:schemeClr val="lt1"/>
+          </a:fontRef>
+        </p:style>
+        <p:txBody>
+          <a:bodyPr rtlCol="0" anchor="ctr"/>
+          <a:lstStyle/>
+          <a:p>
+            <a:pPr algn="ctr"/>
+            <a:endParaRPr lang="en-US"/>
+          </a:p>
+        </p:txBody>
+      </p:sp>
+      <p:sp>
+        <p:nvSpPr>
+          <p:cNvPr id="242" name="Google Shape;242;p24"/>
+          <p:cNvSpPr txBox="1">
+            <a:spLocks noGrp="1"/>
+          </p:cNvSpPr>
+          <p:nvPr>
+            <p:ph type="body" idx="1"/>
+          </p:nvPr>
+        </p:nvSpPr>
+        <p:spPr>
+          <a:xfrm>
+            <a:off x="480060" y="2154674"/>
+            <a:ext cx="3182691" cy="2490501"/>
+          </a:xfrm>
+          <a:prstGeom prst="rect">
+            <a:avLst/>
+          </a:prstGeom>
+        </p:spPr>
+        <p:txBody>
+          <a:bodyPr spcFirstLastPara="1" vert="horz" lIns="91440" tIns="45720" rIns="91440" bIns="45720" rtlCol="0" anchorCtr="0">
+            <a:normAutofit/>
+          </a:bodyPr>
+          <a:lstStyle/>
+          <a:p>
+            <a:pPr marL="0" lvl="0" indent="0" algn="l" defTabSz="914400">
+              <a:spcBef>
+                <a:spcPts val="0"/>
+              </a:spcBef>
+              <a:spcAft>
+                <a:spcPts val="600"/>
+              </a:spcAft>
+              <a:buNone/>
+            </a:pPr>
+            <a:r>
+              <a:rPr lang="en-US" sz="1700" dirty="0"/>
+              <a:t>Reach out to Group 3 with any machine maintenance needs…</a:t>
+            </a:r>
+          </a:p>
+          <a:p>
+            <a:pPr marL="0" lvl="0" indent="0" algn="l" defTabSz="914400">
+              <a:spcBef>
+                <a:spcPts val="0"/>
+              </a:spcBef>
+              <a:spcAft>
+                <a:spcPts val="600"/>
+              </a:spcAft>
+              <a:buNone/>
+            </a:pPr>
+            <a:r>
+              <a:rPr lang="en-US" sz="1700" dirty="0"/>
+              <a:t>Thank you!!</a:t>
+            </a:r>
+          </a:p>
+        </p:txBody>
+      </p:sp>
+      <p:pic>
+        <p:nvPicPr>
+          <p:cNvPr id="244" name="Picture 243" descr="CNC lathe processing">
+            <a:extLst>
+              <a:ext uri="{FF2B5EF4-FFF2-40B4-BE49-F238E27FC236}">
+                <a16:creationId xmlns:a16="http://schemas.microsoft.com/office/drawing/2014/main" id="{DBC0278C-3B74-F789-DD8A-CE485BB85436}"/>
+              </a:ext>
+            </a:extLst>
+          </p:cNvPr>
+          <p:cNvPicPr>
+            <a:picLocks noChangeAspect="1"/>
+          </p:cNvPicPr>
+          <p:nvPr/>
+        </p:nvPicPr>
+        <p:blipFill rotWithShape="1">
+          <a:blip r:embed="rId3"/>
+          <a:srcRect l="33048"/>
+          <a:stretch/>
+        </p:blipFill>
+        <p:spPr>
+          <a:xfrm>
+            <a:off x="3983776" y="10"/>
+            <a:ext cx="5159081" cy="5143490"/>
+          </a:xfrm>
+          <a:custGeom>
+            <a:avLst/>
+            <a:gdLst/>
+            <a:ahLst/>
+            <a:cxnLst/>
+            <a:rect l="l" t="t" r="r" b="b"/>
+            <a:pathLst>
+              <a:path w="6878775" h="6858000">
+                <a:moveTo>
+                  <a:pt x="1102973" y="0"/>
+                </a:moveTo>
+                <a:lnTo>
+                  <a:pt x="1160688" y="0"/>
+                </a:lnTo>
+                <a:lnTo>
+                  <a:pt x="983189" y="331786"/>
+                </a:lnTo>
+                <a:cubicBezTo>
+                  <a:pt x="914866" y="469145"/>
+                  <a:pt x="850355" y="608712"/>
+                  <a:pt x="789261" y="750263"/>
+                </a:cubicBezTo>
+                <a:cubicBezTo>
+                  <a:pt x="774307" y="784928"/>
+                  <a:pt x="759992" y="819849"/>
+                  <a:pt x="745295" y="854514"/>
+                </a:cubicBezTo>
+                <a:cubicBezTo>
+                  <a:pt x="756682" y="845393"/>
+                  <a:pt x="765489" y="833492"/>
+                  <a:pt x="770857" y="819975"/>
+                </a:cubicBezTo>
+                <a:cubicBezTo>
+                  <a:pt x="879943" y="589569"/>
+                  <a:pt x="999605" y="365513"/>
+                  <a:pt x="1131329" y="148742"/>
+                </a:cubicBezTo>
+                <a:lnTo>
+                  <a:pt x="1227589" y="0"/>
+                </a:lnTo>
+                <a:lnTo>
+                  <a:pt x="6878775" y="0"/>
+                </a:lnTo>
+                <a:lnTo>
+                  <a:pt x="6878775" y="6858000"/>
+                </a:lnTo>
+                <a:lnTo>
+                  <a:pt x="713521" y="6858000"/>
+                </a:lnTo>
+                <a:lnTo>
+                  <a:pt x="625642" y="6670527"/>
+                </a:lnTo>
+                <a:cubicBezTo>
+                  <a:pt x="507232" y="6398531"/>
+                  <a:pt x="403083" y="6118381"/>
+                  <a:pt x="312785" y="5830359"/>
+                </a:cubicBezTo>
+                <a:cubicBezTo>
+                  <a:pt x="278149" y="5719759"/>
+                  <a:pt x="248879" y="5607635"/>
+                  <a:pt x="212198" y="5480401"/>
+                </a:cubicBezTo>
+                <a:cubicBezTo>
+                  <a:pt x="212208" y="5491601"/>
+                  <a:pt x="212803" y="5502788"/>
+                  <a:pt x="213988" y="5513923"/>
+                </a:cubicBezTo>
+                <a:cubicBezTo>
+                  <a:pt x="264089" y="5723695"/>
+                  <a:pt x="307290" y="5935370"/>
+                  <a:pt x="365826" y="6142729"/>
+                </a:cubicBezTo>
+                <a:cubicBezTo>
+                  <a:pt x="433152" y="6380817"/>
+                  <a:pt x="510068" y="6614016"/>
+                  <a:pt x="597975" y="6841549"/>
+                </a:cubicBezTo>
+                <a:lnTo>
+                  <a:pt x="604824" y="6858000"/>
+                </a:lnTo>
+                <a:lnTo>
+                  <a:pt x="552056" y="6858000"/>
+                </a:lnTo>
+                <a:lnTo>
+                  <a:pt x="539576" y="6828295"/>
+                </a:lnTo>
+                <a:cubicBezTo>
+                  <a:pt x="380597" y="6414594"/>
+                  <a:pt x="260223" y="5988893"/>
+                  <a:pt x="171555" y="5552906"/>
+                </a:cubicBezTo>
+                <a:cubicBezTo>
+                  <a:pt x="91163" y="5157998"/>
+                  <a:pt x="43746" y="4758899"/>
+                  <a:pt x="12305" y="4357388"/>
+                </a:cubicBezTo>
+                <a:cubicBezTo>
+                  <a:pt x="-14281" y="4013908"/>
+                  <a:pt x="4507" y="3672965"/>
+                  <a:pt x="46684" y="3331516"/>
+                </a:cubicBezTo>
+                <a:cubicBezTo>
+                  <a:pt x="127203" y="2664286"/>
+                  <a:pt x="277819" y="2007265"/>
+                  <a:pt x="496065" y="1371196"/>
+                </a:cubicBezTo>
+                <a:cubicBezTo>
+                  <a:pt x="636273" y="966066"/>
+                  <a:pt x="800445" y="573253"/>
+                  <a:pt x="995723" y="196614"/>
+                </a:cubicBezTo>
+                <a:close/>
+              </a:path>
+            </a:pathLst>
+          </a:custGeom>
+        </p:spPr>
+      </p:pic>
+    </p:spTree>
   </p:cSld>
   <p:clrMapOvr>
     <a:masterClrMapping/>

</xml_diff>

<commit_message>
Updated ppt deck with balanced accuracy scores
</commit_message>
<xml_diff>
--- a/presentation/Machine Maintenance Analysis v2.pptx
+++ b/presentation/Machine Maintenance Analysis v2.pptx
@@ -1696,7 +1696,7 @@
             <a:fld id="{5923F103-BC34-4FE4-A40E-EDDEECFDA5D0}" type="datetimeFigureOut">
               <a:rPr lang="en-US" smtClean="0"/>
               <a:pPr/>
-              <a:t>4/4/2024</a:t>
+              <a:t>4/8/2024</a:t>
             </a:fld>
             <a:endParaRPr lang="en-US" dirty="0"/>
           </a:p>
@@ -1909,7 +1909,7 @@
           <a:p>
             <a:fld id="{53086D93-FCAC-47E0-A2EE-787E62CA814C}" type="datetimeFigureOut">
               <a:rPr lang="en-US" smtClean="0"/>
-              <a:t>4/4/2024</a:t>
+              <a:t>4/8/2024</a:t>
             </a:fld>
             <a:endParaRPr lang="en-US" dirty="0"/>
           </a:p>
@@ -2132,7 +2132,7 @@
           <a:p>
             <a:fld id="{CDA879A6-0FD0-4734-A311-86BFCA472E6E}" type="datetimeFigureOut">
               <a:rPr lang="en-US" smtClean="0"/>
-              <a:t>4/4/2024</a:t>
+              <a:t>4/8/2024</a:t>
             </a:fld>
             <a:endParaRPr lang="en-US" dirty="0"/>
           </a:p>
@@ -3160,7 +3160,7 @@
           <a:p>
             <a:fld id="{19C9CA7B-DFD4-44B5-8C60-D14B8CD1FB59}" type="datetimeFigureOut">
               <a:rPr lang="en-US" smtClean="0"/>
-              <a:t>4/4/2024</a:t>
+              <a:t>4/8/2024</a:t>
             </a:fld>
             <a:endParaRPr lang="en-US" dirty="0"/>
           </a:p>
@@ -3450,7 +3450,7 @@
           <a:p>
             <a:fld id="{F34E6425-0181-43F2-84FC-787E803FD2F8}" type="datetimeFigureOut">
               <a:rPr lang="en-US" smtClean="0"/>
-              <a:t>4/4/2024</a:t>
+              <a:t>4/8/2024</a:t>
             </a:fld>
             <a:endParaRPr lang="en-US" dirty="0"/>
           </a:p>
@@ -3730,7 +3730,7 @@
           <a:p>
             <a:fld id="{3BDB8791-F1B0-41E7-B7FD-A781E65C4266}" type="datetimeFigureOut">
               <a:rPr lang="en-US" smtClean="0"/>
-              <a:t>4/4/2024</a:t>
+              <a:t>4/8/2024</a:t>
             </a:fld>
             <a:endParaRPr lang="en-US" dirty="0"/>
           </a:p>
@@ -4157,7 +4157,7 @@
           <a:p>
             <a:fld id="{5FDD63B2-E120-4ED8-B27B-C685F510A5FE}" type="datetimeFigureOut">
               <a:rPr lang="en-US" smtClean="0"/>
-              <a:t>4/4/2024</a:t>
+              <a:t>4/8/2024</a:t>
             </a:fld>
             <a:endParaRPr lang="en-US" dirty="0"/>
           </a:p>
@@ -4313,7 +4313,7 @@
           <a:p>
             <a:fld id="{7AA18ACC-A947-437B-A130-35BD54FDF1E9}" type="datetimeFigureOut">
               <a:rPr lang="en-US" smtClean="0"/>
-              <a:t>4/4/2024</a:t>
+              <a:t>4/8/2024</a:t>
             </a:fld>
             <a:endParaRPr lang="en-US" dirty="0"/>
           </a:p>
@@ -4441,7 +4441,7 @@
           <a:p>
             <a:fld id="{7C8D7E02-BCB8-4D50-A234-369438C08659}" type="datetimeFigureOut">
               <a:rPr lang="en-US" smtClean="0"/>
-              <a:t>4/4/2024</a:t>
+              <a:t>4/8/2024</a:t>
             </a:fld>
             <a:endParaRPr lang="en-US" dirty="0"/>
           </a:p>
@@ -4766,7 +4766,7 @@
           <a:p>
             <a:fld id="{76E86A4C-8E40-4F87-A4F0-01A0687C5742}" type="datetimeFigureOut">
               <a:rPr lang="en-US" smtClean="0"/>
-              <a:t>4/4/2024</a:t>
+              <a:t>4/8/2024</a:t>
             </a:fld>
             <a:endParaRPr lang="en-US" dirty="0"/>
           </a:p>
@@ -5069,7 +5069,7 @@
           <a:p>
             <a:fld id="{35E72C73-2D91-4E12-BA25-F0AA0C03599B}" type="datetimeFigureOut">
               <a:rPr lang="en-US" smtClean="0"/>
-              <a:t>4/4/2024</a:t>
+              <a:t>4/8/2024</a:t>
             </a:fld>
             <a:endParaRPr lang="en-US" dirty="0"/>
           </a:p>
@@ -5325,7 +5325,7 @@
           <a:p>
             <a:fld id="{2BE451C3-0FF4-47C4-B829-773ADF60F88C}" type="datetimeFigureOut">
               <a:rPr lang="en-US" smtClean="0"/>
-              <a:t>4/4/2024</a:t>
+              <a:t>4/8/2024</a:t>
             </a:fld>
             <a:endParaRPr lang="en-US" dirty="0"/>
           </a:p>
@@ -6435,8 +6435,8 @@
           </a:prstGeom>
         </p:spPr>
         <p:txBody>
-          <a:bodyPr spcFirstLastPara="1" wrap="square" lIns="91425" tIns="91425" rIns="91425" bIns="91425" anchor="t" anchorCtr="0">
-            <a:normAutofit/>
+          <a:bodyPr spcFirstLastPara="1" wrap="square" lIns="91425" tIns="91425" rIns="91425" bIns="91425" anchor="ctr" anchorCtr="0">
+            <a:noAutofit/>
           </a:bodyPr>
           <a:lstStyle/>
           <a:p>
@@ -6450,13 +6450,13 @@
               <a:buNone/>
             </a:pPr>
             <a:r>
-              <a:rPr lang="en" sz="2400" dirty="0">
+              <a:rPr lang="en" sz="3000" dirty="0">
                 <a:latin typeface="Arial" panose="020B0604020202020204" pitchFamily="34" charset="0"/>
                 <a:cs typeface="Arial" panose="020B0604020202020204" pitchFamily="34" charset="0"/>
               </a:rPr>
               <a:t>Executive Summary</a:t>
             </a:r>
-            <a:endParaRPr sz="2400" dirty="0">
+            <a:endParaRPr sz="3000" dirty="0">
               <a:latin typeface="Arial" panose="020B0604020202020204" pitchFamily="34" charset="0"/>
               <a:cs typeface="Arial" panose="020B0604020202020204" pitchFamily="34" charset="0"/>
             </a:endParaRPr>
@@ -7544,7 +7544,7 @@
           </a:prstGeom>
         </p:spPr>
         <p:txBody>
-          <a:bodyPr spcFirstLastPara="1" wrap="square" lIns="91425" tIns="91425" rIns="91425" bIns="91425" anchor="t" anchorCtr="0">
+          <a:bodyPr spcFirstLastPara="1" wrap="square" lIns="91425" tIns="91425" rIns="91425" bIns="91425" anchor="ctr" anchorCtr="0">
             <a:normAutofit fontScale="90000"/>
           </a:bodyPr>
           <a:lstStyle/>
@@ -9433,7 +9433,7 @@
           </a:prstGeom>
         </p:spPr>
         <p:txBody>
-          <a:bodyPr spcFirstLastPara="1" wrap="square" lIns="91425" tIns="91425" rIns="91425" bIns="91425" anchor="t" anchorCtr="0">
+          <a:bodyPr spcFirstLastPara="1" wrap="square" lIns="91425" tIns="91425" rIns="91425" bIns="91425" anchor="ctr" anchorCtr="0">
             <a:normAutofit fontScale="90000"/>
           </a:bodyPr>
           <a:lstStyle/>
@@ -9453,6 +9453,40 @@
                 <a:cs typeface="Arial" panose="020B0604020202020204" pitchFamily="34" charset="0"/>
               </a:rPr>
               <a:t>2) Analyses</a:t>
+            </a:r>
+            <a:r>
+              <a:rPr kumimoji="0" lang="en" b="0" i="1" u="none" strike="noStrike" kern="1200" cap="none" spc="0" normalizeH="0" baseline="0" noProof="0" dirty="0">
+                <a:ln>
+                  <a:noFill/>
+                </a:ln>
+                <a:solidFill>
+                  <a:prstClr val="black"/>
+                </a:solidFill>
+                <a:effectLst/>
+                <a:uLnTx/>
+                <a:uFillTx/>
+                <a:latin typeface="Arial" panose="020B0604020202020204" pitchFamily="34" charset="0"/>
+                <a:ea typeface="+mj-ea"/>
+                <a:cs typeface="Arial" panose="020B0604020202020204" pitchFamily="34" charset="0"/>
+              </a:rPr>
+              <a:t> </a:t>
+            </a:r>
+            <a:r>
+              <a:rPr kumimoji="0" lang="en" sz="2700" b="0" i="1" u="none" strike="noStrike" kern="1200" cap="none" spc="0" normalizeH="0" baseline="0" noProof="0" dirty="0">
+                <a:ln>
+                  <a:noFill/>
+                </a:ln>
+                <a:solidFill>
+                  <a:prstClr val="black"/>
+                </a:solidFill>
+                <a:effectLst/>
+                <a:uLnTx/>
+                <a:uFillTx/>
+                <a:latin typeface="Arial" panose="020B0604020202020204" pitchFamily="34" charset="0"/>
+                <a:ea typeface="+mj-ea"/>
+                <a:cs typeface="Arial" panose="020B0604020202020204" pitchFamily="34" charset="0"/>
+              </a:rPr>
+              <a:t>– Approach</a:t>
             </a:r>
             <a:endParaRPr dirty="0">
               <a:latin typeface="Arial" panose="020B0604020202020204" pitchFamily="34" charset="0"/>
@@ -10613,7 +10647,7 @@
           </a:prstGeom>
         </p:spPr>
         <p:txBody>
-          <a:bodyPr spcFirstLastPara="1" wrap="square" lIns="91425" tIns="91425" rIns="91425" bIns="91425" anchor="t" anchorCtr="0">
+          <a:bodyPr spcFirstLastPara="1" wrap="square" lIns="91425" tIns="91425" rIns="91425" bIns="91425" anchor="ctr" anchorCtr="0">
             <a:normAutofit fontScale="90000"/>
           </a:bodyPr>
           <a:lstStyle/>
@@ -10632,9 +10666,16 @@
                 <a:latin typeface="Arial" panose="020B0604020202020204" pitchFamily="34" charset="0"/>
                 <a:cs typeface="Arial" panose="020B0604020202020204" pitchFamily="34" charset="0"/>
               </a:rPr>
-              <a:t>2) Analyses – Model Accuracy Scores</a:t>
-            </a:r>
-            <a:endParaRPr dirty="0">
+              <a:t>2) Analyses </a:t>
+            </a:r>
+            <a:r>
+              <a:rPr lang="en" sz="2700" i="1" dirty="0">
+                <a:latin typeface="Arial" panose="020B0604020202020204" pitchFamily="34" charset="0"/>
+                <a:cs typeface="Arial" panose="020B0604020202020204" pitchFamily="34" charset="0"/>
+              </a:rPr>
+              <a:t>– Model Balanced Accuracy Scores</a:t>
+            </a:r>
+            <a:endParaRPr i="1" dirty="0">
               <a:latin typeface="Arial" panose="020B0604020202020204" pitchFamily="34" charset="0"/>
               <a:cs typeface="Arial" panose="020B0604020202020204" pitchFamily="34" charset="0"/>
             </a:endParaRPr>
@@ -10656,7 +10697,7 @@
           <p:nvPr>
             <p:extLst>
               <p:ext uri="{D42A27DB-BD31-4B8C-83A1-F6EECF244321}">
-                <p14:modId xmlns:p14="http://schemas.microsoft.com/office/powerpoint/2010/main" val="3848004261"/>
+                <p14:modId xmlns:p14="http://schemas.microsoft.com/office/powerpoint/2010/main" val="3140982981"/>
               </p:ext>
             </p:extLst>
           </p:nvPr>
@@ -10822,7 +10863,7 @@
                           <a:latin typeface="Arial" panose="020B0604020202020204" pitchFamily="34" charset="0"/>
                           <a:cs typeface="Arial" panose="020B0604020202020204" pitchFamily="34" charset="0"/>
                         </a:rPr>
-                        <a:t>0.79</a:t>
+                        <a:t>0.60</a:t>
                       </a:r>
                     </a:p>
                   </a:txBody>
@@ -10842,7 +10883,7 @@
                           <a:latin typeface="Arial" panose="020B0604020202020204" pitchFamily="34" charset="0"/>
                           <a:cs typeface="Arial" panose="020B0604020202020204" pitchFamily="34" charset="0"/>
                         </a:rPr>
-                        <a:t>0.61</a:t>
+                        <a:t>0.82</a:t>
                       </a:r>
                     </a:p>
                   </a:txBody>
@@ -10862,7 +10903,7 @@
                           <a:latin typeface="Arial" panose="020B0604020202020204" pitchFamily="34" charset="0"/>
                           <a:cs typeface="Arial" panose="020B0604020202020204" pitchFamily="34" charset="0"/>
                         </a:rPr>
-                        <a:t>0.60</a:t>
+                        <a:t>0.79</a:t>
                       </a:r>
                     </a:p>
                   </a:txBody>
@@ -10908,7 +10949,7 @@
                           <a:latin typeface="Arial" panose="020B0604020202020204" pitchFamily="34" charset="0"/>
                           <a:cs typeface="Arial" panose="020B0604020202020204" pitchFamily="34" charset="0"/>
                         </a:rPr>
-                        <a:t>0.83</a:t>
+                        <a:t>0.69</a:t>
                       </a:r>
                     </a:p>
                   </a:txBody>
@@ -10928,7 +10969,7 @@
                           <a:latin typeface="Arial" panose="020B0604020202020204" pitchFamily="34" charset="0"/>
                           <a:cs typeface="Arial" panose="020B0604020202020204" pitchFamily="34" charset="0"/>
                         </a:rPr>
-                        <a:t>0.95</a:t>
+                        <a:t>0.67</a:t>
                       </a:r>
                     </a:p>
                   </a:txBody>
@@ -10948,7 +10989,7 @@
                           <a:latin typeface="Arial" panose="020B0604020202020204" pitchFamily="34" charset="0"/>
                           <a:cs typeface="Arial" panose="020B0604020202020204" pitchFamily="34" charset="0"/>
                         </a:rPr>
-                        <a:t>0.77</a:t>
+                        <a:t>0.82</a:t>
                       </a:r>
                     </a:p>
                   </a:txBody>
@@ -10987,14 +11028,14 @@
                     <a:p>
                       <a:pPr algn="ctr"/>
                       <a:r>
-                        <a:rPr lang="en-US" sz="1200" dirty="0">
+                        <a:rPr lang="en-US" sz="1200" b="1" dirty="0">
                           <a:solidFill>
                             <a:schemeClr val="tx1"/>
                           </a:solidFill>
                           <a:latin typeface="Arial" panose="020B0604020202020204" pitchFamily="34" charset="0"/>
                           <a:cs typeface="Arial" panose="020B0604020202020204" pitchFamily="34" charset="0"/>
                         </a:rPr>
-                        <a:t>0.90</a:t>
+                        <a:t>0.88</a:t>
                       </a:r>
                     </a:p>
                   </a:txBody>
@@ -11014,7 +11055,7 @@
                           <a:latin typeface="Arial" panose="020B0604020202020204" pitchFamily="34" charset="0"/>
                           <a:cs typeface="Arial" panose="020B0604020202020204" pitchFamily="34" charset="0"/>
                         </a:rPr>
-                        <a:t>0.94</a:t>
+                        <a:t>0.84</a:t>
                       </a:r>
                     </a:p>
                   </a:txBody>
@@ -11034,7 +11075,7 @@
                           <a:latin typeface="Arial" panose="020B0604020202020204" pitchFamily="34" charset="0"/>
                           <a:cs typeface="Arial" panose="020B0604020202020204" pitchFamily="34" charset="0"/>
                         </a:rPr>
-                        <a:t>0.78</a:t>
+                        <a:t>0.91</a:t>
                       </a:r>
                     </a:p>
                   </a:txBody>
@@ -11080,7 +11121,7 @@
                           <a:latin typeface="Arial" panose="020B0604020202020204" pitchFamily="34" charset="0"/>
                           <a:cs typeface="Arial" panose="020B0604020202020204" pitchFamily="34" charset="0"/>
                         </a:rPr>
-                        <a:t>0.89</a:t>
+                        <a:t>0.76</a:t>
                       </a:r>
                     </a:p>
                   </a:txBody>
@@ -11100,7 +11141,7 @@
                           <a:latin typeface="Arial" panose="020B0604020202020204" pitchFamily="34" charset="0"/>
                           <a:cs typeface="Arial" panose="020B0604020202020204" pitchFamily="34" charset="0"/>
                         </a:rPr>
-                        <a:t>0.96</a:t>
+                        <a:t>0.81</a:t>
                       </a:r>
                     </a:p>
                   </a:txBody>
@@ -11120,7 +11161,7 @@
                           <a:latin typeface="Arial" panose="020B0604020202020204" pitchFamily="34" charset="0"/>
                           <a:cs typeface="Arial" panose="020B0604020202020204" pitchFamily="34" charset="0"/>
                         </a:rPr>
-                        <a:t>0.83</a:t>
+                        <a:t>0.92</a:t>
                       </a:r>
                     </a:p>
                   </a:txBody>
@@ -11166,7 +11207,7 @@
                           <a:latin typeface="Arial" panose="020B0604020202020204" pitchFamily="34" charset="0"/>
                           <a:cs typeface="Arial" panose="020B0604020202020204" pitchFamily="34" charset="0"/>
                         </a:rPr>
-                        <a:t>0.88</a:t>
+                        <a:t>0.69</a:t>
                       </a:r>
                     </a:p>
                   </a:txBody>
@@ -11186,7 +11227,7 @@
                           <a:latin typeface="Arial" panose="020B0604020202020204" pitchFamily="34" charset="0"/>
                           <a:cs typeface="Arial" panose="020B0604020202020204" pitchFamily="34" charset="0"/>
                         </a:rPr>
-                        <a:t>0.97</a:t>
+                        <a:t>0.70</a:t>
                       </a:r>
                     </a:p>
                   </a:txBody>
@@ -11206,7 +11247,7 @@
                           <a:latin typeface="Arial" panose="020B0604020202020204" pitchFamily="34" charset="0"/>
                           <a:cs typeface="Arial" panose="020B0604020202020204" pitchFamily="34" charset="0"/>
                         </a:rPr>
-                        <a:t>0.80</a:t>
+                        <a:t>0.87</a:t>
                       </a:r>
                     </a:p>
                   </a:txBody>
@@ -11252,7 +11293,7 @@
                           <a:latin typeface="Arial" panose="020B0604020202020204" pitchFamily="34" charset="0"/>
                           <a:cs typeface="Arial" panose="020B0604020202020204" pitchFamily="34" charset="0"/>
                         </a:rPr>
-                        <a:t>0.88</a:t>
+                        <a:t>0.82</a:t>
                       </a:r>
                     </a:p>
                   </a:txBody>
@@ -11265,14 +11306,14 @@
                     <a:p>
                       <a:pPr algn="ctr"/>
                       <a:r>
-                        <a:rPr lang="en-US" sz="1200" dirty="0">
+                        <a:rPr lang="en-US" sz="1200" b="0" dirty="0">
                           <a:solidFill>
                             <a:schemeClr val="tx1"/>
                           </a:solidFill>
                           <a:latin typeface="Arial" panose="020B0604020202020204" pitchFamily="34" charset="0"/>
                           <a:cs typeface="Arial" panose="020B0604020202020204" pitchFamily="34" charset="0"/>
                         </a:rPr>
-                        <a:t>0.86</a:t>
+                        <a:t>0.93</a:t>
                       </a:r>
                     </a:p>
                   </a:txBody>
@@ -11285,14 +11326,14 @@
                     <a:p>
                       <a:pPr algn="ctr"/>
                       <a:r>
-                        <a:rPr lang="en-US" sz="1200" dirty="0">
+                        <a:rPr lang="en-US" sz="1200" b="1" dirty="0">
                           <a:solidFill>
                             <a:schemeClr val="tx1"/>
                           </a:solidFill>
                           <a:latin typeface="Arial" panose="020B0604020202020204" pitchFamily="34" charset="0"/>
                           <a:cs typeface="Arial" panose="020B0604020202020204" pitchFamily="34" charset="0"/>
                         </a:rPr>
-                        <a:t>0.83</a:t>
+                        <a:t>0.93</a:t>
                       </a:r>
                     </a:p>
                   </a:txBody>
@@ -11338,7 +11379,7 @@
                           <a:latin typeface="Arial" panose="020B0604020202020204" pitchFamily="34" charset="0"/>
                           <a:cs typeface="Arial" panose="020B0604020202020204" pitchFamily="34" charset="0"/>
                         </a:rPr>
-                        <a:t>0.87</a:t>
+                        <a:t>0.71</a:t>
                       </a:r>
                     </a:p>
                   </a:txBody>
@@ -11351,14 +11392,14 @@
                     <a:p>
                       <a:pPr algn="ctr"/>
                       <a:r>
-                        <a:rPr lang="en-US" sz="1200" dirty="0">
+                        <a:rPr lang="en-US" sz="1200" b="1" dirty="0">
                           <a:solidFill>
                             <a:schemeClr val="tx1"/>
                           </a:solidFill>
                           <a:latin typeface="Arial" panose="020B0604020202020204" pitchFamily="34" charset="0"/>
                           <a:cs typeface="Arial" panose="020B0604020202020204" pitchFamily="34" charset="0"/>
                         </a:rPr>
-                        <a:t>0.84</a:t>
+                        <a:t>0.93</a:t>
                       </a:r>
                     </a:p>
                   </a:txBody>
@@ -11371,14 +11412,14 @@
                     <a:p>
                       <a:pPr algn="ctr"/>
                       <a:r>
-                        <a:rPr lang="en-US" sz="1200" dirty="0">
+                        <a:rPr lang="en-US" sz="1200" b="0" dirty="0">
                           <a:solidFill>
                             <a:schemeClr val="tx1"/>
                           </a:solidFill>
                           <a:latin typeface="Arial" panose="020B0604020202020204" pitchFamily="34" charset="0"/>
                           <a:cs typeface="Arial" panose="020B0604020202020204" pitchFamily="34" charset="0"/>
                         </a:rPr>
-                        <a:t>0.80</a:t>
+                        <a:t>0.93</a:t>
                       </a:r>
                     </a:p>
                   </a:txBody>
@@ -11424,7 +11465,7 @@
                           <a:latin typeface="Arial" panose="020B0604020202020204" pitchFamily="34" charset="0"/>
                           <a:cs typeface="Arial" panose="020B0604020202020204" pitchFamily="34" charset="0"/>
                         </a:rPr>
-                        <a:t>0.86</a:t>
+                        <a:t>0.65</a:t>
                       </a:r>
                     </a:p>
                   </a:txBody>
@@ -11444,7 +11485,7 @@
                           <a:latin typeface="Arial" panose="020B0604020202020204" pitchFamily="34" charset="0"/>
                           <a:cs typeface="Arial" panose="020B0604020202020204" pitchFamily="34" charset="0"/>
                         </a:rPr>
-                        <a:t>0.80</a:t>
+                        <a:t>0.91</a:t>
                       </a:r>
                     </a:p>
                   </a:txBody>
@@ -11464,7 +11505,7 @@
                           <a:latin typeface="Arial" panose="020B0604020202020204" pitchFamily="34" charset="0"/>
                           <a:cs typeface="Arial" panose="020B0604020202020204" pitchFamily="34" charset="0"/>
                         </a:rPr>
-                        <a:t>0.82</a:t>
+                        <a:t>0.83</a:t>
                       </a:r>
                     </a:p>
                   </a:txBody>
@@ -11510,7 +11551,7 @@
                           <a:latin typeface="Arial" panose="020B0604020202020204" pitchFamily="34" charset="0"/>
                           <a:cs typeface="Arial" panose="020B0604020202020204" pitchFamily="34" charset="0"/>
                         </a:rPr>
-                        <a:t>0.80</a:t>
+                        <a:t>0.62</a:t>
                       </a:r>
                     </a:p>
                   </a:txBody>
@@ -11530,7 +11571,7 @@
                           <a:latin typeface="Arial" panose="020B0604020202020204" pitchFamily="34" charset="0"/>
                           <a:cs typeface="Arial" panose="020B0604020202020204" pitchFamily="34" charset="0"/>
                         </a:rPr>
-                        <a:t>0.75</a:t>
+                        <a:t>0.83</a:t>
                       </a:r>
                     </a:p>
                   </a:txBody>
@@ -11550,7 +11591,7 @@
                           <a:latin typeface="Arial" panose="020B0604020202020204" pitchFamily="34" charset="0"/>
                           <a:cs typeface="Arial" panose="020B0604020202020204" pitchFamily="34" charset="0"/>
                         </a:rPr>
-                        <a:t>0.77</a:t>
+                        <a:t>0.81</a:t>
                       </a:r>
                     </a:p>
                   </a:txBody>
@@ -11624,7 +11665,7 @@
           </a:prstGeom>
         </p:spPr>
         <p:txBody>
-          <a:bodyPr spcFirstLastPara="1" wrap="square" lIns="91425" tIns="91425" rIns="91425" bIns="91425" anchor="t" anchorCtr="0">
+          <a:bodyPr spcFirstLastPara="1" wrap="square" lIns="91425" tIns="91425" rIns="91425" bIns="91425" anchor="ctr" anchorCtr="0">
             <a:normAutofit fontScale="90000"/>
           </a:bodyPr>
           <a:lstStyle/>
@@ -11643,9 +11684,16 @@
                 <a:latin typeface="Arial" panose="020B0604020202020204" pitchFamily="34" charset="0"/>
                 <a:cs typeface="Arial" panose="020B0604020202020204" pitchFamily="34" charset="0"/>
               </a:rPr>
-              <a:t>2) Analyses – Decision Tree</a:t>
-            </a:r>
-            <a:endParaRPr dirty="0">
+              <a:t>2) Analyses </a:t>
+            </a:r>
+            <a:r>
+              <a:rPr lang="en" sz="2700" i="1" dirty="0">
+                <a:latin typeface="Arial" panose="020B0604020202020204" pitchFamily="34" charset="0"/>
+                <a:cs typeface="Arial" panose="020B0604020202020204" pitchFamily="34" charset="0"/>
+              </a:rPr>
+              <a:t>– Decision Tree</a:t>
+            </a:r>
+            <a:endParaRPr i="1" dirty="0">
               <a:latin typeface="Arial" panose="020B0604020202020204" pitchFamily="34" charset="0"/>
               <a:cs typeface="Arial" panose="020B0604020202020204" pitchFamily="34" charset="0"/>
             </a:endParaRPr>
@@ -11757,7 +11805,7 @@
           </a:prstGeom>
         </p:spPr>
         <p:txBody>
-          <a:bodyPr spcFirstLastPara="1" wrap="square" lIns="91425" tIns="91425" rIns="91425" bIns="91425" anchor="t" anchorCtr="0">
+          <a:bodyPr spcFirstLastPara="1" wrap="square" lIns="91425" tIns="91425" rIns="91425" bIns="91425" anchor="ctr" anchorCtr="0">
             <a:normAutofit fontScale="90000"/>
           </a:bodyPr>
           <a:lstStyle/>
@@ -11776,9 +11824,16 @@
                 <a:latin typeface="Arial" panose="020B0604020202020204" pitchFamily="34" charset="0"/>
                 <a:cs typeface="Arial" panose="020B0604020202020204" pitchFamily="34" charset="0"/>
               </a:rPr>
-              <a:t>2) Analyses – Feature Contribution</a:t>
-            </a:r>
-            <a:endParaRPr dirty="0">
+              <a:t>2) Analyses </a:t>
+            </a:r>
+            <a:r>
+              <a:rPr lang="en" sz="2700" i="1" dirty="0">
+                <a:latin typeface="Arial" panose="020B0604020202020204" pitchFamily="34" charset="0"/>
+                <a:cs typeface="Arial" panose="020B0604020202020204" pitchFamily="34" charset="0"/>
+              </a:rPr>
+              <a:t>– Feature Contribution</a:t>
+            </a:r>
+            <a:endParaRPr i="1" dirty="0">
               <a:latin typeface="Arial" panose="020B0604020202020204" pitchFamily="34" charset="0"/>
               <a:cs typeface="Arial" panose="020B0604020202020204" pitchFamily="34" charset="0"/>
             </a:endParaRPr>
@@ -14253,7 +14308,7 @@
           </a:prstGeom>
         </p:spPr>
         <p:txBody>
-          <a:bodyPr spcFirstLastPara="1" wrap="square" lIns="91425" tIns="91425" rIns="91425" bIns="91425" anchor="t" anchorCtr="0">
+          <a:bodyPr spcFirstLastPara="1" wrap="square" lIns="91425" tIns="91425" rIns="91425" bIns="91425" anchor="ctr" anchorCtr="0">
             <a:normAutofit fontScale="90000"/>
           </a:bodyPr>
           <a:lstStyle/>

</xml_diff>